<commit_message>
Ostatecznie poprawki, poprawienie prezentacji
</commit_message>
<xml_diff>
--- a/Projekt_grupa_5.pptx
+++ b/Projekt_grupa_5.pptx
@@ -5,24 +5,26 @@
     <p:sldMasterId id="2147483690" r:id="rId1"/>
   </p:sldMasterIdLst>
   <p:notesMasterIdLst>
-    <p:notesMasterId r:id="rId17"/>
+    <p:notesMasterId r:id="rId19"/>
   </p:notesMasterIdLst>
   <p:sldIdLst>
     <p:sldId id="256" r:id="rId2"/>
     <p:sldId id="257" r:id="rId3"/>
     <p:sldId id="258" r:id="rId4"/>
     <p:sldId id="259" r:id="rId5"/>
-    <p:sldId id="260" r:id="rId6"/>
-    <p:sldId id="261" r:id="rId7"/>
-    <p:sldId id="262" r:id="rId8"/>
-    <p:sldId id="263" r:id="rId9"/>
-    <p:sldId id="265" r:id="rId10"/>
-    <p:sldId id="266" r:id="rId11"/>
-    <p:sldId id="270" r:id="rId12"/>
-    <p:sldId id="267" r:id="rId13"/>
-    <p:sldId id="264" r:id="rId14"/>
-    <p:sldId id="268" r:id="rId15"/>
-    <p:sldId id="269" r:id="rId16"/>
+    <p:sldId id="271" r:id="rId6"/>
+    <p:sldId id="260" r:id="rId7"/>
+    <p:sldId id="261" r:id="rId8"/>
+    <p:sldId id="262" r:id="rId9"/>
+    <p:sldId id="263" r:id="rId10"/>
+    <p:sldId id="265" r:id="rId11"/>
+    <p:sldId id="266" r:id="rId12"/>
+    <p:sldId id="270" r:id="rId13"/>
+    <p:sldId id="267" r:id="rId14"/>
+    <p:sldId id="264" r:id="rId15"/>
+    <p:sldId id="268" r:id="rId16"/>
+    <p:sldId id="272" r:id="rId17"/>
+    <p:sldId id="269" r:id="rId18"/>
   </p:sldIdLst>
   <p:sldSz cx="12192000" cy="6858000"/>
   <p:notesSz cx="6858000" cy="9144000"/>
@@ -211,7 +213,7 @@
           <a:p>
             <a:fld id="{4A8571C9-DFD4-4C91-BA14-D2F788DD3DA4}" type="datetimeFigureOut">
               <a:rPr lang="pl-PL" smtClean="0"/>
-              <a:t>03.06.2024</a:t>
+              <a:t>11.06.2024</a:t>
             </a:fld>
             <a:endParaRPr lang="pl-PL"/>
           </a:p>
@@ -543,7 +545,7 @@
           <a:p>
             <a:fld id="{4DC43FB0-EF88-4B7D-8614-B2B896C8CCE2}" type="slidenum">
               <a:rPr lang="pl-PL" smtClean="0"/>
-              <a:t>8</a:t>
+              <a:t>9</a:t>
             </a:fld>
             <a:endParaRPr lang="pl-PL"/>
           </a:p>
@@ -612,7 +614,7 @@
           <a:noFill/>
           <a:extLst>
             <a:ext uri="{909E8E84-426E-40dd-AFC4-6F175D3DCCD1}">
-              <a14:hiddenFill xmlns:a14="http://schemas.microsoft.com/office/drawing/2010/main" xmlns="">
+              <a14:hiddenFill xmlns="" xmlns:a14="http://schemas.microsoft.com/office/drawing/2010/main">
                 <a:solidFill>
                   <a:srgbClr val="FFFFFF"/>
                 </a:solidFill>
@@ -672,7 +674,7 @@
             </a:ln>
             <a:extLst>
               <a:ext uri="{91240B29-F687-4f45-9708-019B960494DF}">
-                <a14:hiddenLine xmlns:a14="http://schemas.microsoft.com/office/drawing/2010/main" xmlns="" w="9525">
+                <a14:hiddenLine xmlns="" xmlns:a14="http://schemas.microsoft.com/office/drawing/2010/main" w="9525">
                   <a:solidFill>
                     <a:srgbClr val="000000"/>
                   </a:solidFill>
@@ -762,7 +764,7 @@
             </a:ln>
             <a:extLst>
               <a:ext uri="{91240B29-F687-4f45-9708-019B960494DF}">
-                <a14:hiddenLine xmlns:a14="http://schemas.microsoft.com/office/drawing/2010/main" xmlns="" w="9525">
+                <a14:hiddenLine xmlns="" xmlns:a14="http://schemas.microsoft.com/office/drawing/2010/main" w="9525">
                   <a:solidFill>
                     <a:srgbClr val="000000"/>
                   </a:solidFill>
@@ -852,7 +854,7 @@
             </a:ln>
             <a:extLst>
               <a:ext uri="{91240B29-F687-4f45-9708-019B960494DF}">
-                <a14:hiddenLine xmlns:a14="http://schemas.microsoft.com/office/drawing/2010/main" xmlns="" w="9525">
+                <a14:hiddenLine xmlns="" xmlns:a14="http://schemas.microsoft.com/office/drawing/2010/main" w="9525">
                   <a:solidFill>
                     <a:srgbClr val="000000"/>
                   </a:solidFill>
@@ -886,7 +888,7 @@
             </a:ln>
             <a:extLst>
               <a:ext uri="{91240B29-F687-4f45-9708-019B960494DF}">
-                <a14:hiddenLine xmlns:a14="http://schemas.microsoft.com/office/drawing/2010/main" xmlns="" w="9525">
+                <a14:hiddenLine xmlns="" xmlns:a14="http://schemas.microsoft.com/office/drawing/2010/main" w="9525">
                   <a:solidFill>
                     <a:srgbClr val="000000"/>
                   </a:solidFill>
@@ -976,7 +978,7 @@
             </a:ln>
             <a:extLst>
               <a:ext uri="{91240B29-F687-4f45-9708-019B960494DF}">
-                <a14:hiddenLine xmlns:a14="http://schemas.microsoft.com/office/drawing/2010/main" xmlns="" w="9525">
+                <a14:hiddenLine xmlns="" xmlns:a14="http://schemas.microsoft.com/office/drawing/2010/main" w="9525">
                   <a:solidFill>
                     <a:srgbClr val="000000"/>
                   </a:solidFill>
@@ -1038,7 +1040,7 @@
             </a:ln>
             <a:extLst>
               <a:ext uri="{91240B29-F687-4f45-9708-019B960494DF}">
-                <a14:hiddenLine xmlns:a14="http://schemas.microsoft.com/office/drawing/2010/main" xmlns="" w="9525">
+                <a14:hiddenLine xmlns="" xmlns:a14="http://schemas.microsoft.com/office/drawing/2010/main" w="9525">
                   <a:solidFill>
                     <a:srgbClr val="000000"/>
                   </a:solidFill>
@@ -1100,7 +1102,7 @@
             </a:ln>
             <a:extLst>
               <a:ext uri="{91240B29-F687-4f45-9708-019B960494DF}">
-                <a14:hiddenLine xmlns:a14="http://schemas.microsoft.com/office/drawing/2010/main" xmlns="" w="9525">
+                <a14:hiddenLine xmlns="" xmlns:a14="http://schemas.microsoft.com/office/drawing/2010/main" w="9525">
                   <a:solidFill>
                     <a:srgbClr val="000000"/>
                   </a:solidFill>
@@ -1190,7 +1192,7 @@
             </a:ln>
             <a:extLst>
               <a:ext uri="{91240B29-F687-4f45-9708-019B960494DF}">
-                <a14:hiddenLine xmlns:a14="http://schemas.microsoft.com/office/drawing/2010/main" xmlns="" w="9525">
+                <a14:hiddenLine xmlns="" xmlns:a14="http://schemas.microsoft.com/office/drawing/2010/main" w="9525">
                   <a:solidFill>
                     <a:srgbClr val="000000"/>
                   </a:solidFill>
@@ -1252,7 +1254,7 @@
             </a:ln>
             <a:extLst>
               <a:ext uri="{91240B29-F687-4f45-9708-019B960494DF}">
-                <a14:hiddenLine xmlns:a14="http://schemas.microsoft.com/office/drawing/2010/main" xmlns="" w="9525">
+                <a14:hiddenLine xmlns="" xmlns:a14="http://schemas.microsoft.com/office/drawing/2010/main" w="9525">
                   <a:solidFill>
                     <a:srgbClr val="000000"/>
                   </a:solidFill>
@@ -1314,7 +1316,7 @@
             </a:ln>
             <a:extLst>
               <a:ext uri="{91240B29-F687-4f45-9708-019B960494DF}">
-                <a14:hiddenLine xmlns:a14="http://schemas.microsoft.com/office/drawing/2010/main" xmlns="" w="9525">
+                <a14:hiddenLine xmlns="" xmlns:a14="http://schemas.microsoft.com/office/drawing/2010/main" w="9525">
                   <a:solidFill>
                     <a:srgbClr val="000000"/>
                   </a:solidFill>
@@ -1404,7 +1406,7 @@
             </a:ln>
             <a:extLst>
               <a:ext uri="{91240B29-F687-4f45-9708-019B960494DF}">
-                <a14:hiddenLine xmlns:a14="http://schemas.microsoft.com/office/drawing/2010/main" xmlns="" w="9525">
+                <a14:hiddenLine xmlns="" xmlns:a14="http://schemas.microsoft.com/office/drawing/2010/main" w="9525">
                   <a:solidFill>
                     <a:srgbClr val="000000"/>
                   </a:solidFill>
@@ -1494,7 +1496,7 @@
             </a:ln>
             <a:extLst>
               <a:ext uri="{91240B29-F687-4f45-9708-019B960494DF}">
-                <a14:hiddenLine xmlns:a14="http://schemas.microsoft.com/office/drawing/2010/main" xmlns="" w="9525">
+                <a14:hiddenLine xmlns="" xmlns:a14="http://schemas.microsoft.com/office/drawing/2010/main" w="9525">
                   <a:solidFill>
                     <a:srgbClr val="000000"/>
                   </a:solidFill>
@@ -1556,7 +1558,7 @@
             </a:ln>
             <a:extLst>
               <a:ext uri="{91240B29-F687-4f45-9708-019B960494DF}">
-                <a14:hiddenLine xmlns:a14="http://schemas.microsoft.com/office/drawing/2010/main" xmlns="" w="9525">
+                <a14:hiddenLine xmlns="" xmlns:a14="http://schemas.microsoft.com/office/drawing/2010/main" w="9525">
                   <a:solidFill>
                     <a:srgbClr val="000000"/>
                   </a:solidFill>
@@ -1666,7 +1668,7 @@
             </a:ln>
             <a:extLst>
               <a:ext uri="{91240B29-F687-4f45-9708-019B960494DF}">
-                <a14:hiddenLine xmlns:a14="http://schemas.microsoft.com/office/drawing/2010/main" xmlns="" w="9525">
+                <a14:hiddenLine xmlns="" xmlns:a14="http://schemas.microsoft.com/office/drawing/2010/main" w="9525">
                   <a:solidFill>
                     <a:srgbClr val="000000"/>
                   </a:solidFill>
@@ -1728,7 +1730,7 @@
             </a:ln>
             <a:extLst>
               <a:ext uri="{91240B29-F687-4f45-9708-019B960494DF}">
-                <a14:hiddenLine xmlns:a14="http://schemas.microsoft.com/office/drawing/2010/main" xmlns="" w="9525">
+                <a14:hiddenLine xmlns="" xmlns:a14="http://schemas.microsoft.com/office/drawing/2010/main" w="9525">
                   <a:solidFill>
                     <a:srgbClr val="000000"/>
                   </a:solidFill>
@@ -1818,7 +1820,7 @@
             </a:ln>
             <a:extLst>
               <a:ext uri="{91240B29-F687-4f45-9708-019B960494DF}">
-                <a14:hiddenLine xmlns:a14="http://schemas.microsoft.com/office/drawing/2010/main" xmlns="" w="9525">
+                <a14:hiddenLine xmlns="" xmlns:a14="http://schemas.microsoft.com/office/drawing/2010/main" w="9525">
                   <a:solidFill>
                     <a:srgbClr val="000000"/>
                   </a:solidFill>
@@ -1908,7 +1910,7 @@
             </a:ln>
             <a:extLst>
               <a:ext uri="{91240B29-F687-4f45-9708-019B960494DF}">
-                <a14:hiddenLine xmlns:a14="http://schemas.microsoft.com/office/drawing/2010/main" xmlns="" w="9525">
+                <a14:hiddenLine xmlns="" xmlns:a14="http://schemas.microsoft.com/office/drawing/2010/main" w="9525">
                   <a:solidFill>
                     <a:srgbClr val="000000"/>
                   </a:solidFill>
@@ -1970,7 +1972,7 @@
             </a:ln>
             <a:extLst>
               <a:ext uri="{91240B29-F687-4f45-9708-019B960494DF}">
-                <a14:hiddenLine xmlns:a14="http://schemas.microsoft.com/office/drawing/2010/main" xmlns="" w="9525">
+                <a14:hiddenLine xmlns="" xmlns:a14="http://schemas.microsoft.com/office/drawing/2010/main" w="9525">
                   <a:solidFill>
                     <a:srgbClr val="000000"/>
                   </a:solidFill>
@@ -2060,7 +2062,7 @@
             </a:ln>
             <a:extLst>
               <a:ext uri="{91240B29-F687-4f45-9708-019B960494DF}">
-                <a14:hiddenLine xmlns:a14="http://schemas.microsoft.com/office/drawing/2010/main" xmlns="" w="9525">
+                <a14:hiddenLine xmlns="" xmlns:a14="http://schemas.microsoft.com/office/drawing/2010/main" w="9525">
                   <a:solidFill>
                     <a:srgbClr val="000000"/>
                   </a:solidFill>
@@ -2150,7 +2152,7 @@
             </a:ln>
             <a:extLst>
               <a:ext uri="{91240B29-F687-4f45-9708-019B960494DF}">
-                <a14:hiddenLine xmlns:a14="http://schemas.microsoft.com/office/drawing/2010/main" xmlns="" w="9525">
+                <a14:hiddenLine xmlns="" xmlns:a14="http://schemas.microsoft.com/office/drawing/2010/main" w="9525">
                   <a:solidFill>
                     <a:srgbClr val="000000"/>
                   </a:solidFill>
@@ -2206,7 +2208,7 @@
             </a:ln>
             <a:extLst>
               <a:ext uri="{91240B29-F687-4f45-9708-019B960494DF}">
-                <a14:hiddenLine xmlns:a14="http://schemas.microsoft.com/office/drawing/2010/main" xmlns="" w="9525">
+                <a14:hiddenLine xmlns="" xmlns:a14="http://schemas.microsoft.com/office/drawing/2010/main" w="9525">
                   <a:solidFill>
                     <a:srgbClr val="000000"/>
                   </a:solidFill>
@@ -2296,7 +2298,7 @@
             </a:ln>
             <a:extLst>
               <a:ext uri="{91240B29-F687-4f45-9708-019B960494DF}">
-                <a14:hiddenLine xmlns:a14="http://schemas.microsoft.com/office/drawing/2010/main" xmlns="" w="9525">
+                <a14:hiddenLine xmlns="" xmlns:a14="http://schemas.microsoft.com/office/drawing/2010/main" w="9525">
                   <a:solidFill>
                     <a:srgbClr val="000000"/>
                   </a:solidFill>
@@ -2352,7 +2354,7 @@
             </a:ln>
             <a:extLst>
               <a:ext uri="{91240B29-F687-4f45-9708-019B960494DF}">
-                <a14:hiddenLine xmlns:a14="http://schemas.microsoft.com/office/drawing/2010/main" xmlns="" w="9525">
+                <a14:hiddenLine xmlns="" xmlns:a14="http://schemas.microsoft.com/office/drawing/2010/main" w="9525">
                   <a:solidFill>
                     <a:srgbClr val="000000"/>
                   </a:solidFill>
@@ -2442,7 +2444,7 @@
             </a:ln>
             <a:extLst>
               <a:ext uri="{91240B29-F687-4f45-9708-019B960494DF}">
-                <a14:hiddenLine xmlns:a14="http://schemas.microsoft.com/office/drawing/2010/main" xmlns="" w="9525">
+                <a14:hiddenLine xmlns="" xmlns:a14="http://schemas.microsoft.com/office/drawing/2010/main" w="9525">
                   <a:solidFill>
                     <a:srgbClr val="000000"/>
                   </a:solidFill>
@@ -2510,7 +2512,7 @@
             </a:ln>
             <a:extLst>
               <a:ext uri="{91240B29-F687-4f45-9708-019B960494DF}">
-                <a14:hiddenLine xmlns:a14="http://schemas.microsoft.com/office/drawing/2010/main" xmlns="" w="9525">
+                <a14:hiddenLine xmlns="" xmlns:a14="http://schemas.microsoft.com/office/drawing/2010/main" w="9525">
                   <a:solidFill>
                     <a:srgbClr val="000000"/>
                   </a:solidFill>
@@ -2600,7 +2602,7 @@
             </a:ln>
             <a:extLst>
               <a:ext uri="{91240B29-F687-4f45-9708-019B960494DF}">
-                <a14:hiddenLine xmlns:a14="http://schemas.microsoft.com/office/drawing/2010/main" xmlns="" w="9525">
+                <a14:hiddenLine xmlns="" xmlns:a14="http://schemas.microsoft.com/office/drawing/2010/main" w="9525">
                   <a:solidFill>
                     <a:srgbClr val="000000"/>
                   </a:solidFill>
@@ -2668,7 +2670,7 @@
             </a:ln>
             <a:extLst>
               <a:ext uri="{91240B29-F687-4f45-9708-019B960494DF}">
-                <a14:hiddenLine xmlns:a14="http://schemas.microsoft.com/office/drawing/2010/main" xmlns="" w="9525">
+                <a14:hiddenLine xmlns="" xmlns:a14="http://schemas.microsoft.com/office/drawing/2010/main" w="9525">
                   <a:solidFill>
                     <a:srgbClr val="000000"/>
                   </a:solidFill>
@@ -2758,7 +2760,7 @@
             </a:ln>
             <a:extLst>
               <a:ext uri="{91240B29-F687-4f45-9708-019B960494DF}">
-                <a14:hiddenLine xmlns:a14="http://schemas.microsoft.com/office/drawing/2010/main" xmlns="" w="9525">
+                <a14:hiddenLine xmlns="" xmlns:a14="http://schemas.microsoft.com/office/drawing/2010/main" w="9525">
                   <a:solidFill>
                     <a:srgbClr val="000000"/>
                   </a:solidFill>
@@ -2792,7 +2794,7 @@
             </a:ln>
             <a:extLst>
               <a:ext uri="{91240B29-F687-4f45-9708-019B960494DF}">
-                <a14:hiddenLine xmlns:a14="http://schemas.microsoft.com/office/drawing/2010/main" xmlns="" w="9525">
+                <a14:hiddenLine xmlns="" xmlns:a14="http://schemas.microsoft.com/office/drawing/2010/main" w="9525">
                   <a:solidFill>
                     <a:srgbClr val="000000"/>
                   </a:solidFill>
@@ -2882,7 +2884,7 @@
             </a:ln>
             <a:extLst>
               <a:ext uri="{91240B29-F687-4f45-9708-019B960494DF}">
-                <a14:hiddenLine xmlns:a14="http://schemas.microsoft.com/office/drawing/2010/main" xmlns="" w="9525">
+                <a14:hiddenLine xmlns="" xmlns:a14="http://schemas.microsoft.com/office/drawing/2010/main" w="9525">
                   <a:solidFill>
                     <a:srgbClr val="000000"/>
                   </a:solidFill>
@@ -2944,7 +2946,7 @@
             </a:ln>
             <a:extLst>
               <a:ext uri="{91240B29-F687-4f45-9708-019B960494DF}">
-                <a14:hiddenLine xmlns:a14="http://schemas.microsoft.com/office/drawing/2010/main" xmlns="" w="9525">
+                <a14:hiddenLine xmlns="" xmlns:a14="http://schemas.microsoft.com/office/drawing/2010/main" w="9525">
                   <a:solidFill>
                     <a:srgbClr val="000000"/>
                   </a:solidFill>
@@ -3006,7 +3008,7 @@
             </a:ln>
             <a:extLst>
               <a:ext uri="{91240B29-F687-4f45-9708-019B960494DF}">
-                <a14:hiddenLine xmlns:a14="http://schemas.microsoft.com/office/drawing/2010/main" xmlns="" w="9525">
+                <a14:hiddenLine xmlns="" xmlns:a14="http://schemas.microsoft.com/office/drawing/2010/main" w="9525">
                   <a:solidFill>
                     <a:srgbClr val="000000"/>
                   </a:solidFill>
@@ -3096,7 +3098,7 @@
             </a:ln>
             <a:extLst>
               <a:ext uri="{91240B29-F687-4f45-9708-019B960494DF}">
-                <a14:hiddenLine xmlns:a14="http://schemas.microsoft.com/office/drawing/2010/main" xmlns="" w="9525">
+                <a14:hiddenLine xmlns="" xmlns:a14="http://schemas.microsoft.com/office/drawing/2010/main" w="9525">
                   <a:solidFill>
                     <a:srgbClr val="000000"/>
                   </a:solidFill>
@@ -3164,7 +3166,7 @@
             </a:ln>
             <a:extLst>
               <a:ext uri="{91240B29-F687-4f45-9708-019B960494DF}">
-                <a14:hiddenLine xmlns:a14="http://schemas.microsoft.com/office/drawing/2010/main" xmlns="" w="9525">
+                <a14:hiddenLine xmlns="" xmlns:a14="http://schemas.microsoft.com/office/drawing/2010/main" w="9525">
                   <a:solidFill>
                     <a:srgbClr val="000000"/>
                   </a:solidFill>
@@ -3226,7 +3228,7 @@
             </a:ln>
             <a:extLst>
               <a:ext uri="{91240B29-F687-4f45-9708-019B960494DF}">
-                <a14:hiddenLine xmlns:a14="http://schemas.microsoft.com/office/drawing/2010/main" xmlns="" w="9525">
+                <a14:hiddenLine xmlns="" xmlns:a14="http://schemas.microsoft.com/office/drawing/2010/main" w="9525">
                   <a:solidFill>
                     <a:srgbClr val="000000"/>
                   </a:solidFill>
@@ -3316,7 +3318,7 @@
             </a:ln>
             <a:extLst>
               <a:ext uri="{91240B29-F687-4f45-9708-019B960494DF}">
-                <a14:hiddenLine xmlns:a14="http://schemas.microsoft.com/office/drawing/2010/main" xmlns="" w="9525">
+                <a14:hiddenLine xmlns="" xmlns:a14="http://schemas.microsoft.com/office/drawing/2010/main" w="9525">
                   <a:solidFill>
                     <a:srgbClr val="000000"/>
                   </a:solidFill>
@@ -3378,7 +3380,7 @@
             </a:ln>
             <a:extLst>
               <a:ext uri="{91240B29-F687-4f45-9708-019B960494DF}">
-                <a14:hiddenLine xmlns:a14="http://schemas.microsoft.com/office/drawing/2010/main" xmlns="" w="9525">
+                <a14:hiddenLine xmlns="" xmlns:a14="http://schemas.microsoft.com/office/drawing/2010/main" w="9525">
                   <a:solidFill>
                     <a:srgbClr val="000000"/>
                   </a:solidFill>
@@ -3468,7 +3470,7 @@
             </a:ln>
             <a:extLst>
               <a:ext uri="{91240B29-F687-4f45-9708-019B960494DF}">
-                <a14:hiddenLine xmlns:a14="http://schemas.microsoft.com/office/drawing/2010/main" xmlns="" w="9525">
+                <a14:hiddenLine xmlns="" xmlns:a14="http://schemas.microsoft.com/office/drawing/2010/main" w="9525">
                   <a:solidFill>
                     <a:srgbClr val="000000"/>
                   </a:solidFill>
@@ -3530,7 +3532,7 @@
             </a:ln>
             <a:extLst>
               <a:ext uri="{91240B29-F687-4f45-9708-019B960494DF}">
-                <a14:hiddenLine xmlns:a14="http://schemas.microsoft.com/office/drawing/2010/main" xmlns="" w="9525">
+                <a14:hiddenLine xmlns="" xmlns:a14="http://schemas.microsoft.com/office/drawing/2010/main" w="9525">
                   <a:solidFill>
                     <a:srgbClr val="000000"/>
                   </a:solidFill>
@@ -3620,7 +3622,7 @@
             </a:ln>
             <a:extLst>
               <a:ext uri="{91240B29-F687-4f45-9708-019B960494DF}">
-                <a14:hiddenLine xmlns:a14="http://schemas.microsoft.com/office/drawing/2010/main" xmlns="" w="9525">
+                <a14:hiddenLine xmlns="" xmlns:a14="http://schemas.microsoft.com/office/drawing/2010/main" w="9525">
                   <a:solidFill>
                     <a:srgbClr val="000000"/>
                   </a:solidFill>
@@ -3654,7 +3656,7 @@
             </a:ln>
             <a:extLst>
               <a:ext uri="{91240B29-F687-4f45-9708-019B960494DF}">
-                <a14:hiddenLine xmlns:a14="http://schemas.microsoft.com/office/drawing/2010/main" xmlns="" w="9525">
+                <a14:hiddenLine xmlns="" xmlns:a14="http://schemas.microsoft.com/office/drawing/2010/main" w="9525">
                   <a:solidFill>
                     <a:srgbClr val="000000"/>
                   </a:solidFill>
@@ -3719,7 +3721,7 @@
             </a:ln>
             <a:extLst>
               <a:ext uri="{91240B29-F687-4f45-9708-019B960494DF}">
-                <a14:hiddenLine xmlns:a14="http://schemas.microsoft.com/office/drawing/2010/main" xmlns="" w="9525">
+                <a14:hiddenLine xmlns="" xmlns:a14="http://schemas.microsoft.com/office/drawing/2010/main" w="9525">
                   <a:solidFill>
                     <a:srgbClr val="000000"/>
                   </a:solidFill>
@@ -3809,7 +3811,7 @@
             </a:ln>
             <a:extLst>
               <a:ext uri="{91240B29-F687-4f45-9708-019B960494DF}">
-                <a14:hiddenLine xmlns:a14="http://schemas.microsoft.com/office/drawing/2010/main" xmlns="" w="9525">
+                <a14:hiddenLine xmlns="" xmlns:a14="http://schemas.microsoft.com/office/drawing/2010/main" w="9525">
                   <a:solidFill>
                     <a:srgbClr val="000000"/>
                   </a:solidFill>
@@ -3871,7 +3873,7 @@
             </a:ln>
             <a:extLst>
               <a:ext uri="{91240B29-F687-4f45-9708-019B960494DF}">
-                <a14:hiddenLine xmlns:a14="http://schemas.microsoft.com/office/drawing/2010/main" xmlns="" w="9525">
+                <a14:hiddenLine xmlns="" xmlns:a14="http://schemas.microsoft.com/office/drawing/2010/main" w="9525">
                   <a:solidFill>
                     <a:srgbClr val="000000"/>
                   </a:solidFill>
@@ -3961,7 +3963,7 @@
             </a:ln>
             <a:extLst>
               <a:ext uri="{91240B29-F687-4f45-9708-019B960494DF}">
-                <a14:hiddenLine xmlns:a14="http://schemas.microsoft.com/office/drawing/2010/main" xmlns="" w="9525">
+                <a14:hiddenLine xmlns="" xmlns:a14="http://schemas.microsoft.com/office/drawing/2010/main" w="9525">
                   <a:solidFill>
                     <a:srgbClr val="000000"/>
                   </a:solidFill>
@@ -4051,7 +4053,7 @@
             </a:ln>
             <a:extLst>
               <a:ext uri="{91240B29-F687-4f45-9708-019B960494DF}">
-                <a14:hiddenLine xmlns:a14="http://schemas.microsoft.com/office/drawing/2010/main" xmlns="" w="9525">
+                <a14:hiddenLine xmlns="" xmlns:a14="http://schemas.microsoft.com/office/drawing/2010/main" w="9525">
                   <a:solidFill>
                     <a:srgbClr val="000000"/>
                   </a:solidFill>
@@ -4116,7 +4118,7 @@
             </a:ln>
             <a:extLst>
               <a:ext uri="{91240B29-F687-4f45-9708-019B960494DF}">
-                <a14:hiddenLine xmlns:a14="http://schemas.microsoft.com/office/drawing/2010/main" xmlns="" w="9525">
+                <a14:hiddenLine xmlns="" xmlns:a14="http://schemas.microsoft.com/office/drawing/2010/main" w="9525">
                   <a:solidFill>
                     <a:srgbClr val="000000"/>
                   </a:solidFill>
@@ -4178,7 +4180,7 @@
             </a:ln>
             <a:extLst>
               <a:ext uri="{91240B29-F687-4f45-9708-019B960494DF}">
-                <a14:hiddenLine xmlns:a14="http://schemas.microsoft.com/office/drawing/2010/main" xmlns="" w="9525">
+                <a14:hiddenLine xmlns="" xmlns:a14="http://schemas.microsoft.com/office/drawing/2010/main" w="9525">
                   <a:solidFill>
                     <a:srgbClr val="000000"/>
                   </a:solidFill>
@@ -4268,7 +4270,7 @@
             </a:ln>
             <a:extLst>
               <a:ext uri="{91240B29-F687-4f45-9708-019B960494DF}">
-                <a14:hiddenLine xmlns:a14="http://schemas.microsoft.com/office/drawing/2010/main" xmlns="" w="9525">
+                <a14:hiddenLine xmlns="" xmlns:a14="http://schemas.microsoft.com/office/drawing/2010/main" w="9525">
                   <a:solidFill>
                     <a:srgbClr val="000000"/>
                   </a:solidFill>
@@ -4358,7 +4360,7 @@
             </a:ln>
             <a:extLst>
               <a:ext uri="{91240B29-F687-4f45-9708-019B960494DF}">
-                <a14:hiddenLine xmlns:a14="http://schemas.microsoft.com/office/drawing/2010/main" xmlns="" w="9525">
+                <a14:hiddenLine xmlns="" xmlns:a14="http://schemas.microsoft.com/office/drawing/2010/main" w="9525">
                   <a:solidFill>
                     <a:srgbClr val="000000"/>
                   </a:solidFill>
@@ -4420,7 +4422,7 @@
             </a:ln>
             <a:extLst>
               <a:ext uri="{91240B29-F687-4f45-9708-019B960494DF}">
-                <a14:hiddenLine xmlns:a14="http://schemas.microsoft.com/office/drawing/2010/main" xmlns="" w="9525">
+                <a14:hiddenLine xmlns="" xmlns:a14="http://schemas.microsoft.com/office/drawing/2010/main" w="9525">
                   <a:solidFill>
                     <a:srgbClr val="000000"/>
                   </a:solidFill>
@@ -4540,7 +4542,7 @@
             </a:ln>
             <a:extLst>
               <a:ext uri="{91240B29-F687-4f45-9708-019B960494DF}">
-                <a14:hiddenLine xmlns:a14="http://schemas.microsoft.com/office/drawing/2010/main" xmlns="" w="9525">
+                <a14:hiddenLine xmlns="" xmlns:a14="http://schemas.microsoft.com/office/drawing/2010/main" w="9525">
                   <a:solidFill>
                     <a:srgbClr val="000000"/>
                   </a:solidFill>
@@ -4608,7 +4610,7 @@
             </a:ln>
             <a:extLst>
               <a:ext uri="{91240B29-F687-4f45-9708-019B960494DF}">
-                <a14:hiddenLine xmlns:a14="http://schemas.microsoft.com/office/drawing/2010/main" xmlns="" w="9525">
+                <a14:hiddenLine xmlns="" xmlns:a14="http://schemas.microsoft.com/office/drawing/2010/main" w="9525">
                   <a:solidFill>
                     <a:srgbClr val="000000"/>
                   </a:solidFill>
@@ -4698,7 +4700,7 @@
             </a:ln>
             <a:extLst>
               <a:ext uri="{91240B29-F687-4f45-9708-019B960494DF}">
-                <a14:hiddenLine xmlns:a14="http://schemas.microsoft.com/office/drawing/2010/main" xmlns="" w="9525">
+                <a14:hiddenLine xmlns="" xmlns:a14="http://schemas.microsoft.com/office/drawing/2010/main" w="9525">
                   <a:solidFill>
                     <a:srgbClr val="000000"/>
                   </a:solidFill>
@@ -4838,7 +4840,7 @@
           <a:p>
             <a:fld id="{D92D4D73-2BC1-4F9B-ADE1-9A0180AB0DCF}" type="datetimeFigureOut">
               <a:rPr lang="pl-PL" smtClean="0"/>
-              <a:t>03.06.2024</a:t>
+              <a:t>11.06.2024</a:t>
             </a:fld>
             <a:endParaRPr lang="pl-PL"/>
           </a:p>
@@ -5105,7 +5107,7 @@
           <a:p>
             <a:fld id="{D92D4D73-2BC1-4F9B-ADE1-9A0180AB0DCF}" type="datetimeFigureOut">
               <a:rPr lang="pl-PL" smtClean="0"/>
-              <a:t>03.06.2024</a:t>
+              <a:t>11.06.2024</a:t>
             </a:fld>
             <a:endParaRPr lang="pl-PL"/>
           </a:p>
@@ -5301,7 +5303,7 @@
           <a:p>
             <a:fld id="{D92D4D73-2BC1-4F9B-ADE1-9A0180AB0DCF}" type="datetimeFigureOut">
               <a:rPr lang="pl-PL" smtClean="0"/>
-              <a:t>03.06.2024</a:t>
+              <a:t>11.06.2024</a:t>
             </a:fld>
             <a:endParaRPr lang="pl-PL"/>
           </a:p>
@@ -5564,7 +5566,7 @@
           <a:p>
             <a:fld id="{D92D4D73-2BC1-4F9B-ADE1-9A0180AB0DCF}" type="datetimeFigureOut">
               <a:rPr lang="pl-PL" smtClean="0"/>
-              <a:t>03.06.2024</a:t>
+              <a:t>11.06.2024</a:t>
             </a:fld>
             <a:endParaRPr lang="pl-PL"/>
           </a:p>
@@ -5998,7 +6000,7 @@
           <a:p>
             <a:fld id="{D92D4D73-2BC1-4F9B-ADE1-9A0180AB0DCF}" type="datetimeFigureOut">
               <a:rPr lang="pl-PL" smtClean="0"/>
-              <a:t>03.06.2024</a:t>
+              <a:t>11.06.2024</a:t>
             </a:fld>
             <a:endParaRPr lang="pl-PL"/>
           </a:p>
@@ -6544,7 +6546,7 @@
           <a:p>
             <a:fld id="{D92D4D73-2BC1-4F9B-ADE1-9A0180AB0DCF}" type="datetimeFigureOut">
               <a:rPr lang="pl-PL" smtClean="0"/>
-              <a:t>03.06.2024</a:t>
+              <a:t>11.06.2024</a:t>
             </a:fld>
             <a:endParaRPr lang="pl-PL"/>
           </a:p>
@@ -7264,7 +7266,7 @@
           <a:p>
             <a:fld id="{D92D4D73-2BC1-4F9B-ADE1-9A0180AB0DCF}" type="datetimeFigureOut">
               <a:rPr lang="pl-PL" smtClean="0"/>
-              <a:t>03.06.2024</a:t>
+              <a:t>11.06.2024</a:t>
             </a:fld>
             <a:endParaRPr lang="pl-PL"/>
           </a:p>
@@ -7434,7 +7436,7 @@
           <a:p>
             <a:fld id="{D92D4D73-2BC1-4F9B-ADE1-9A0180AB0DCF}" type="datetimeFigureOut">
               <a:rPr lang="pl-PL" smtClean="0"/>
-              <a:t>03.06.2024</a:t>
+              <a:t>11.06.2024</a:t>
             </a:fld>
             <a:endParaRPr lang="pl-PL"/>
           </a:p>
@@ -7614,7 +7616,7 @@
           <a:p>
             <a:fld id="{D92D4D73-2BC1-4F9B-ADE1-9A0180AB0DCF}" type="datetimeFigureOut">
               <a:rPr lang="pl-PL" smtClean="0"/>
-              <a:t>03.06.2024</a:t>
+              <a:t>11.06.2024</a:t>
             </a:fld>
             <a:endParaRPr lang="pl-PL"/>
           </a:p>
@@ -7784,7 +7786,7 @@
           <a:p>
             <a:fld id="{D92D4D73-2BC1-4F9B-ADE1-9A0180AB0DCF}" type="datetimeFigureOut">
               <a:rPr lang="pl-PL" smtClean="0"/>
-              <a:t>03.06.2024</a:t>
+              <a:t>11.06.2024</a:t>
             </a:fld>
             <a:endParaRPr lang="pl-PL"/>
           </a:p>
@@ -8034,7 +8036,7 @@
           <a:p>
             <a:fld id="{D92D4D73-2BC1-4F9B-ADE1-9A0180AB0DCF}" type="datetimeFigureOut">
               <a:rPr lang="pl-PL" smtClean="0"/>
-              <a:t>03.06.2024</a:t>
+              <a:t>11.06.2024</a:t>
             </a:fld>
             <a:endParaRPr lang="pl-PL"/>
           </a:p>
@@ -8266,7 +8268,7 @@
           <a:p>
             <a:fld id="{D92D4D73-2BC1-4F9B-ADE1-9A0180AB0DCF}" type="datetimeFigureOut">
               <a:rPr lang="pl-PL" smtClean="0"/>
-              <a:t>03.06.2024</a:t>
+              <a:t>11.06.2024</a:t>
             </a:fld>
             <a:endParaRPr lang="pl-PL"/>
           </a:p>
@@ -8647,7 +8649,7 @@
           <a:p>
             <a:fld id="{D92D4D73-2BC1-4F9B-ADE1-9A0180AB0DCF}" type="datetimeFigureOut">
               <a:rPr lang="pl-PL" smtClean="0"/>
-              <a:t>03.06.2024</a:t>
+              <a:t>11.06.2024</a:t>
             </a:fld>
             <a:endParaRPr lang="pl-PL"/>
           </a:p>
@@ -8765,7 +8767,7 @@
           <a:p>
             <a:fld id="{D92D4D73-2BC1-4F9B-ADE1-9A0180AB0DCF}" type="datetimeFigureOut">
               <a:rPr lang="pl-PL" smtClean="0"/>
-              <a:t>03.06.2024</a:t>
+              <a:t>11.06.2024</a:t>
             </a:fld>
             <a:endParaRPr lang="pl-PL"/>
           </a:p>
@@ -8860,7 +8862,7 @@
           <a:p>
             <a:fld id="{D92D4D73-2BC1-4F9B-ADE1-9A0180AB0DCF}" type="datetimeFigureOut">
               <a:rPr lang="pl-PL" smtClean="0"/>
-              <a:t>03.06.2024</a:t>
+              <a:t>11.06.2024</a:t>
             </a:fld>
             <a:endParaRPr lang="pl-PL"/>
           </a:p>
@@ -9109,7 +9111,7 @@
           <a:p>
             <a:fld id="{D92D4D73-2BC1-4F9B-ADE1-9A0180AB0DCF}" type="datetimeFigureOut">
               <a:rPr lang="pl-PL" smtClean="0"/>
-              <a:t>03.06.2024</a:t>
+              <a:t>11.06.2024</a:t>
             </a:fld>
             <a:endParaRPr lang="pl-PL"/>
           </a:p>
@@ -9389,7 +9391,7 @@
           <a:p>
             <a:fld id="{D92D4D73-2BC1-4F9B-ADE1-9A0180AB0DCF}" type="datetimeFigureOut">
               <a:rPr lang="pl-PL" smtClean="0"/>
-              <a:t>03.06.2024</a:t>
+              <a:t>11.06.2024</a:t>
             </a:fld>
             <a:endParaRPr lang="pl-PL"/>
           </a:p>
@@ -9505,7 +9507,7 @@
           <a:noFill/>
           <a:extLst>
             <a:ext uri="{909E8E84-426E-40dd-AFC4-6F175D3DCCD1}">
-              <a14:hiddenFill xmlns:a14="http://schemas.microsoft.com/office/drawing/2010/main" xmlns="">
+              <a14:hiddenFill xmlns="" xmlns:a14="http://schemas.microsoft.com/office/drawing/2010/main">
                 <a:solidFill>
                   <a:srgbClr val="FFFFFF"/>
                 </a:solidFill>
@@ -9579,7 +9581,7 @@
               </a:ln>
               <a:extLst>
                 <a:ext uri="{91240B29-F687-4f45-9708-019B960494DF}">
-                  <a14:hiddenLine xmlns:a14="http://schemas.microsoft.com/office/drawing/2010/main" xmlns="" w="9525">
+                  <a14:hiddenLine xmlns="" xmlns:a14="http://schemas.microsoft.com/office/drawing/2010/main" w="9525">
                     <a:solidFill>
                       <a:srgbClr val="000000"/>
                     </a:solidFill>
@@ -9669,7 +9671,7 @@
               </a:ln>
               <a:extLst>
                 <a:ext uri="{91240B29-F687-4f45-9708-019B960494DF}">
-                  <a14:hiddenLine xmlns:a14="http://schemas.microsoft.com/office/drawing/2010/main" xmlns="" w="9525">
+                  <a14:hiddenLine xmlns="" xmlns:a14="http://schemas.microsoft.com/office/drawing/2010/main" w="9525">
                     <a:solidFill>
                       <a:srgbClr val="000000"/>
                     </a:solidFill>
@@ -9759,7 +9761,7 @@
               </a:ln>
               <a:extLst>
                 <a:ext uri="{91240B29-F687-4f45-9708-019B960494DF}">
-                  <a14:hiddenLine xmlns:a14="http://schemas.microsoft.com/office/drawing/2010/main" xmlns="" w="9525">
+                  <a14:hiddenLine xmlns="" xmlns:a14="http://schemas.microsoft.com/office/drawing/2010/main" w="9525">
                     <a:solidFill>
                       <a:srgbClr val="000000"/>
                     </a:solidFill>
@@ -9821,7 +9823,7 @@
               </a:ln>
               <a:extLst>
                 <a:ext uri="{91240B29-F687-4f45-9708-019B960494DF}">
-                  <a14:hiddenLine xmlns:a14="http://schemas.microsoft.com/office/drawing/2010/main" xmlns="" w="9525">
+                  <a14:hiddenLine xmlns="" xmlns:a14="http://schemas.microsoft.com/office/drawing/2010/main" w="9525">
                     <a:solidFill>
                       <a:srgbClr val="000000"/>
                     </a:solidFill>
@@ -9911,7 +9913,7 @@
               </a:ln>
               <a:extLst>
                 <a:ext uri="{91240B29-F687-4f45-9708-019B960494DF}">
-                  <a14:hiddenLine xmlns:a14="http://schemas.microsoft.com/office/drawing/2010/main" xmlns="" w="9525">
+                  <a14:hiddenLine xmlns="" xmlns:a14="http://schemas.microsoft.com/office/drawing/2010/main" w="9525">
                     <a:solidFill>
                       <a:srgbClr val="000000"/>
                     </a:solidFill>
@@ -9973,7 +9975,7 @@
               </a:ln>
               <a:extLst>
                 <a:ext uri="{91240B29-F687-4f45-9708-019B960494DF}">
-                  <a14:hiddenLine xmlns:a14="http://schemas.microsoft.com/office/drawing/2010/main" xmlns="" w="9525">
+                  <a14:hiddenLine xmlns="" xmlns:a14="http://schemas.microsoft.com/office/drawing/2010/main" w="9525">
                     <a:solidFill>
                       <a:srgbClr val="000000"/>
                     </a:solidFill>
@@ -10035,7 +10037,7 @@
               </a:ln>
               <a:extLst>
                 <a:ext uri="{91240B29-F687-4f45-9708-019B960494DF}">
-                  <a14:hiddenLine xmlns:a14="http://schemas.microsoft.com/office/drawing/2010/main" xmlns="" w="9525">
+                  <a14:hiddenLine xmlns="" xmlns:a14="http://schemas.microsoft.com/office/drawing/2010/main" w="9525">
                     <a:solidFill>
                       <a:srgbClr val="000000"/>
                     </a:solidFill>
@@ -10125,7 +10127,7 @@
               </a:ln>
               <a:extLst>
                 <a:ext uri="{91240B29-F687-4f45-9708-019B960494DF}">
-                  <a14:hiddenLine xmlns:a14="http://schemas.microsoft.com/office/drawing/2010/main" xmlns="" w="9525">
+                  <a14:hiddenLine xmlns="" xmlns:a14="http://schemas.microsoft.com/office/drawing/2010/main" w="9525">
                     <a:solidFill>
                       <a:srgbClr val="000000"/>
                     </a:solidFill>
@@ -10215,7 +10217,7 @@
               </a:ln>
               <a:extLst>
                 <a:ext uri="{91240B29-F687-4f45-9708-019B960494DF}">
-                  <a14:hiddenLine xmlns:a14="http://schemas.microsoft.com/office/drawing/2010/main" xmlns="" w="9525">
+                  <a14:hiddenLine xmlns="" xmlns:a14="http://schemas.microsoft.com/office/drawing/2010/main" w="9525">
                     <a:solidFill>
                       <a:srgbClr val="000000"/>
                     </a:solidFill>
@@ -10277,7 +10279,7 @@
               </a:ln>
               <a:extLst>
                 <a:ext uri="{91240B29-F687-4f45-9708-019B960494DF}">
-                  <a14:hiddenLine xmlns:a14="http://schemas.microsoft.com/office/drawing/2010/main" xmlns="" w="9525">
+                  <a14:hiddenLine xmlns="" xmlns:a14="http://schemas.microsoft.com/office/drawing/2010/main" w="9525">
                     <a:solidFill>
                       <a:srgbClr val="000000"/>
                     </a:solidFill>
@@ -10387,7 +10389,7 @@
               </a:ln>
               <a:extLst>
                 <a:ext uri="{91240B29-F687-4f45-9708-019B960494DF}">
-                  <a14:hiddenLine xmlns:a14="http://schemas.microsoft.com/office/drawing/2010/main" xmlns="" w="9525">
+                  <a14:hiddenLine xmlns="" xmlns:a14="http://schemas.microsoft.com/office/drawing/2010/main" w="9525">
                     <a:solidFill>
                       <a:srgbClr val="000000"/>
                     </a:solidFill>
@@ -10471,7 +10473,7 @@
               </a:ln>
               <a:extLst>
                 <a:ext uri="{91240B29-F687-4f45-9708-019B960494DF}">
-                  <a14:hiddenLine xmlns:a14="http://schemas.microsoft.com/office/drawing/2010/main" xmlns="" w="9525">
+                  <a14:hiddenLine xmlns="" xmlns:a14="http://schemas.microsoft.com/office/drawing/2010/main" w="9525">
                     <a:solidFill>
                       <a:srgbClr val="000000"/>
                     </a:solidFill>
@@ -10533,7 +10535,7 @@
               </a:ln>
               <a:extLst>
                 <a:ext uri="{91240B29-F687-4f45-9708-019B960494DF}">
-                  <a14:hiddenLine xmlns:a14="http://schemas.microsoft.com/office/drawing/2010/main" xmlns="" w="9525">
+                  <a14:hiddenLine xmlns="" xmlns:a14="http://schemas.microsoft.com/office/drawing/2010/main" w="9525">
                     <a:solidFill>
                       <a:srgbClr val="000000"/>
                     </a:solidFill>
@@ -10595,7 +10597,7 @@
               </a:ln>
               <a:extLst>
                 <a:ext uri="{91240B29-F687-4f45-9708-019B960494DF}">
-                  <a14:hiddenLine xmlns:a14="http://schemas.microsoft.com/office/drawing/2010/main" xmlns="" w="9525">
+                  <a14:hiddenLine xmlns="" xmlns:a14="http://schemas.microsoft.com/office/drawing/2010/main" w="9525">
                     <a:solidFill>
                       <a:srgbClr val="000000"/>
                     </a:solidFill>
@@ -10685,7 +10687,7 @@
               </a:ln>
               <a:extLst>
                 <a:ext uri="{91240B29-F687-4f45-9708-019B960494DF}">
-                  <a14:hiddenLine xmlns:a14="http://schemas.microsoft.com/office/drawing/2010/main" xmlns="" w="9525">
+                  <a14:hiddenLine xmlns="" xmlns:a14="http://schemas.microsoft.com/office/drawing/2010/main" w="9525">
                     <a:solidFill>
                       <a:srgbClr val="000000"/>
                     </a:solidFill>
@@ -10719,7 +10721,7 @@
               </a:ln>
               <a:extLst>
                 <a:ext uri="{91240B29-F687-4f45-9708-019B960494DF}">
-                  <a14:hiddenLine xmlns:a14="http://schemas.microsoft.com/office/drawing/2010/main" xmlns="" w="9525">
+                  <a14:hiddenLine xmlns="" xmlns:a14="http://schemas.microsoft.com/office/drawing/2010/main" w="9525">
                     <a:solidFill>
                       <a:srgbClr val="000000"/>
                     </a:solidFill>
@@ -10784,7 +10786,7 @@
               </a:ln>
               <a:extLst>
                 <a:ext uri="{91240B29-F687-4f45-9708-019B960494DF}">
-                  <a14:hiddenLine xmlns:a14="http://schemas.microsoft.com/office/drawing/2010/main" xmlns="" w="9525">
+                  <a14:hiddenLine xmlns="" xmlns:a14="http://schemas.microsoft.com/office/drawing/2010/main" w="9525">
                     <a:solidFill>
                       <a:srgbClr val="000000"/>
                     </a:solidFill>
@@ -10874,7 +10876,7 @@
               </a:ln>
               <a:extLst>
                 <a:ext uri="{91240B29-F687-4f45-9708-019B960494DF}">
-                  <a14:hiddenLine xmlns:a14="http://schemas.microsoft.com/office/drawing/2010/main" xmlns="" w="9525">
+                  <a14:hiddenLine xmlns="" xmlns:a14="http://schemas.microsoft.com/office/drawing/2010/main" w="9525">
                     <a:solidFill>
                       <a:srgbClr val="000000"/>
                     </a:solidFill>
@@ -10936,7 +10938,7 @@
               </a:ln>
               <a:extLst>
                 <a:ext uri="{91240B29-F687-4f45-9708-019B960494DF}">
-                  <a14:hiddenLine xmlns:a14="http://schemas.microsoft.com/office/drawing/2010/main" xmlns="" w="9525">
+                  <a14:hiddenLine xmlns="" xmlns:a14="http://schemas.microsoft.com/office/drawing/2010/main" w="9525">
                     <a:solidFill>
                       <a:srgbClr val="000000"/>
                     </a:solidFill>
@@ -11026,7 +11028,7 @@
               </a:ln>
               <a:extLst>
                 <a:ext uri="{91240B29-F687-4f45-9708-019B960494DF}">
-                  <a14:hiddenLine xmlns:a14="http://schemas.microsoft.com/office/drawing/2010/main" xmlns="" w="9525">
+                  <a14:hiddenLine xmlns="" xmlns:a14="http://schemas.microsoft.com/office/drawing/2010/main" w="9525">
                     <a:solidFill>
                       <a:srgbClr val="000000"/>
                     </a:solidFill>
@@ -11091,7 +11093,7 @@
               </a:ln>
               <a:extLst>
                 <a:ext uri="{91240B29-F687-4f45-9708-019B960494DF}">
-                  <a14:hiddenLine xmlns:a14="http://schemas.microsoft.com/office/drawing/2010/main" xmlns="" w="9525">
+                  <a14:hiddenLine xmlns="" xmlns:a14="http://schemas.microsoft.com/office/drawing/2010/main" w="9525">
                     <a:solidFill>
                       <a:srgbClr val="000000"/>
                     </a:solidFill>
@@ -11153,7 +11155,7 @@
               </a:ln>
               <a:extLst>
                 <a:ext uri="{91240B29-F687-4f45-9708-019B960494DF}">
-                  <a14:hiddenLine xmlns:a14="http://schemas.microsoft.com/office/drawing/2010/main" xmlns="" w="9525">
+                  <a14:hiddenLine xmlns="" xmlns:a14="http://schemas.microsoft.com/office/drawing/2010/main" w="9525">
                     <a:solidFill>
                       <a:srgbClr val="000000"/>
                     </a:solidFill>
@@ -11243,7 +11245,7 @@
               </a:ln>
               <a:extLst>
                 <a:ext uri="{91240B29-F687-4f45-9708-019B960494DF}">
-                  <a14:hiddenLine xmlns:a14="http://schemas.microsoft.com/office/drawing/2010/main" xmlns="" w="9525">
+                  <a14:hiddenLine xmlns="" xmlns:a14="http://schemas.microsoft.com/office/drawing/2010/main" w="9525">
                     <a:solidFill>
                       <a:srgbClr val="000000"/>
                     </a:solidFill>
@@ -11333,7 +11335,7 @@
               </a:ln>
               <a:extLst>
                 <a:ext uri="{91240B29-F687-4f45-9708-019B960494DF}">
-                  <a14:hiddenLine xmlns:a14="http://schemas.microsoft.com/office/drawing/2010/main" xmlns="" w="9525">
+                  <a14:hiddenLine xmlns="" xmlns:a14="http://schemas.microsoft.com/office/drawing/2010/main" w="9525">
                     <a:solidFill>
                       <a:srgbClr val="000000"/>
                     </a:solidFill>
@@ -11398,7 +11400,7 @@
               </a:ln>
               <a:extLst>
                 <a:ext uri="{91240B29-F687-4f45-9708-019B960494DF}">
-                  <a14:hiddenLine xmlns:a14="http://schemas.microsoft.com/office/drawing/2010/main" xmlns="" w="9525">
+                  <a14:hiddenLine xmlns="" xmlns:a14="http://schemas.microsoft.com/office/drawing/2010/main" w="9525">
                     <a:solidFill>
                       <a:srgbClr val="000000"/>
                     </a:solidFill>
@@ -11518,7 +11520,7 @@
               </a:ln>
               <a:extLst>
                 <a:ext uri="{91240B29-F687-4f45-9708-019B960494DF}">
-                  <a14:hiddenLine xmlns:a14="http://schemas.microsoft.com/office/drawing/2010/main" xmlns="" w="9525">
+                  <a14:hiddenLine xmlns="" xmlns:a14="http://schemas.microsoft.com/office/drawing/2010/main" w="9525">
                     <a:solidFill>
                       <a:srgbClr val="000000"/>
                     </a:solidFill>
@@ -11616,7 +11618,7 @@
               </a:ln>
               <a:extLst>
                 <a:ext uri="{91240B29-F687-4f45-9708-019B960494DF}">
-                  <a14:hiddenLine xmlns:a14="http://schemas.microsoft.com/office/drawing/2010/main" xmlns="" w="9525">
+                  <a14:hiddenLine xmlns="" xmlns:a14="http://schemas.microsoft.com/office/drawing/2010/main" w="9525">
                     <a:solidFill>
                       <a:srgbClr val="000000"/>
                     </a:solidFill>
@@ -11731,7 +11733,7 @@
               </a:ln>
               <a:extLst>
                 <a:ext uri="{91240B29-F687-4f45-9708-019B960494DF}">
-                  <a14:hiddenLine xmlns:a14="http://schemas.microsoft.com/office/drawing/2010/main" xmlns="" w="9525">
+                  <a14:hiddenLine xmlns="" xmlns:a14="http://schemas.microsoft.com/office/drawing/2010/main" w="9525">
                     <a:solidFill>
                       <a:srgbClr val="000000"/>
                     </a:solidFill>
@@ -11821,7 +11823,7 @@
               </a:ln>
               <a:extLst>
                 <a:ext uri="{91240B29-F687-4f45-9708-019B960494DF}">
-                  <a14:hiddenLine xmlns:a14="http://schemas.microsoft.com/office/drawing/2010/main" xmlns="" w="9525">
+                  <a14:hiddenLine xmlns="" xmlns:a14="http://schemas.microsoft.com/office/drawing/2010/main" w="9525">
                     <a:solidFill>
                       <a:srgbClr val="000000"/>
                     </a:solidFill>
@@ -11886,7 +11888,7 @@
               </a:ln>
               <a:extLst>
                 <a:ext uri="{91240B29-F687-4f45-9708-019B960494DF}">
-                  <a14:hiddenLine xmlns:a14="http://schemas.microsoft.com/office/drawing/2010/main" xmlns="" w="9525">
+                  <a14:hiddenLine xmlns="" xmlns:a14="http://schemas.microsoft.com/office/drawing/2010/main" w="9525">
                     <a:solidFill>
                       <a:srgbClr val="000000"/>
                     </a:solidFill>
@@ -11976,7 +11978,7 @@
               </a:ln>
               <a:extLst>
                 <a:ext uri="{91240B29-F687-4f45-9708-019B960494DF}">
-                  <a14:hiddenLine xmlns:a14="http://schemas.microsoft.com/office/drawing/2010/main" xmlns="" w="9525">
+                  <a14:hiddenLine xmlns="" xmlns:a14="http://schemas.microsoft.com/office/drawing/2010/main" w="9525">
                     <a:solidFill>
                       <a:srgbClr val="000000"/>
                     </a:solidFill>
@@ -12044,7 +12046,7 @@
               </a:ln>
               <a:extLst>
                 <a:ext uri="{91240B29-F687-4f45-9708-019B960494DF}">
-                  <a14:hiddenLine xmlns:a14="http://schemas.microsoft.com/office/drawing/2010/main" xmlns="" w="9525">
+                  <a14:hiddenLine xmlns="" xmlns:a14="http://schemas.microsoft.com/office/drawing/2010/main" w="9525">
                     <a:solidFill>
                       <a:srgbClr val="000000"/>
                     </a:solidFill>
@@ -12134,7 +12136,7 @@
               </a:ln>
               <a:extLst>
                 <a:ext uri="{91240B29-F687-4f45-9708-019B960494DF}">
-                  <a14:hiddenLine xmlns:a14="http://schemas.microsoft.com/office/drawing/2010/main" xmlns="" w="9525">
+                  <a14:hiddenLine xmlns="" xmlns:a14="http://schemas.microsoft.com/office/drawing/2010/main" w="9525">
                     <a:solidFill>
                       <a:srgbClr val="000000"/>
                     </a:solidFill>
@@ -12202,7 +12204,7 @@
               </a:ln>
               <a:extLst>
                 <a:ext uri="{91240B29-F687-4f45-9708-019B960494DF}">
-                  <a14:hiddenLine xmlns:a14="http://schemas.microsoft.com/office/drawing/2010/main" xmlns="" w="9525">
+                  <a14:hiddenLine xmlns="" xmlns:a14="http://schemas.microsoft.com/office/drawing/2010/main" w="9525">
                     <a:solidFill>
                       <a:srgbClr val="000000"/>
                     </a:solidFill>
@@ -12292,7 +12294,7 @@
               </a:ln>
               <a:extLst>
                 <a:ext uri="{91240B29-F687-4f45-9708-019B960494DF}">
-                  <a14:hiddenLine xmlns:a14="http://schemas.microsoft.com/office/drawing/2010/main" xmlns="" w="9525">
+                  <a14:hiddenLine xmlns="" xmlns:a14="http://schemas.microsoft.com/office/drawing/2010/main" w="9525">
                     <a:solidFill>
                       <a:srgbClr val="000000"/>
                     </a:solidFill>
@@ -12326,7 +12328,7 @@
               </a:ln>
               <a:extLst>
                 <a:ext uri="{91240B29-F687-4f45-9708-019B960494DF}">
-                  <a14:hiddenLine xmlns:a14="http://schemas.microsoft.com/office/drawing/2010/main" xmlns="" w="9525">
+                  <a14:hiddenLine xmlns="" xmlns:a14="http://schemas.microsoft.com/office/drawing/2010/main" w="9525">
                     <a:solidFill>
                       <a:srgbClr val="000000"/>
                     </a:solidFill>
@@ -12466,7 +12468,7 @@
           <a:p>
             <a:fld id="{D92D4D73-2BC1-4F9B-ADE1-9A0180AB0DCF}" type="datetimeFigureOut">
               <a:rPr lang="pl-PL" smtClean="0"/>
-              <a:t>03.06.2024</a:t>
+              <a:t>11.06.2024</a:t>
             </a:fld>
             <a:endParaRPr lang="pl-PL"/>
           </a:p>
@@ -12998,6 +13000,101 @@
           <p:cNvPr id="2" name="Tytuł 1">
             <a:extLst>
               <a:ext uri="{FF2B5EF4-FFF2-40B4-BE49-F238E27FC236}">
+                <a16:creationId xmlns:a16="http://schemas.microsoft.com/office/drawing/2014/main" id="{C3FB3FE0-8103-C281-783D-D81E9602BA8F}"/>
+              </a:ext>
+            </a:extLst>
+          </p:cNvPr>
+          <p:cNvSpPr>
+            <a:spLocks noGrp="1"/>
+          </p:cNvSpPr>
+          <p:nvPr>
+            <p:ph type="title"/>
+          </p:nvPr>
+        </p:nvSpPr>
+        <p:spPr/>
+        <p:txBody>
+          <a:bodyPr/>
+          <a:lstStyle/>
+          <a:p>
+            <a:pPr algn="ctr"/>
+            <a:r>
+              <a:rPr lang="pl-PL" dirty="0"/>
+              <a:t>Krok 1:</a:t>
+            </a:r>
+            <a:br>
+              <a:rPr lang="pl-PL" dirty="0"/>
+            </a:br>
+            <a:r>
+              <a:rPr lang="pl-PL" dirty="0"/>
+              <a:t>Negacja zbiorów</a:t>
+            </a:r>
+          </a:p>
+        </p:txBody>
+      </p:sp>
+      <p:pic>
+        <p:nvPicPr>
+          <p:cNvPr id="8" name="Symbol zastępczy zawartości 7">
+            <a:extLst>
+              <a:ext uri="{FF2B5EF4-FFF2-40B4-BE49-F238E27FC236}">
+                <a16:creationId xmlns:a16="http://schemas.microsoft.com/office/drawing/2014/main" id="{B66A8C8F-9939-2B98-9CE9-5057A69D5F45}"/>
+              </a:ext>
+            </a:extLst>
+          </p:cNvPr>
+          <p:cNvPicPr>
+            <a:picLocks noGrp="1" noChangeAspect="1"/>
+          </p:cNvPicPr>
+          <p:nvPr>
+            <p:ph idx="1"/>
+          </p:nvPr>
+        </p:nvPicPr>
+        <p:blipFill>
+          <a:blip r:embed="rId2"/>
+          <a:stretch>
+            <a:fillRect/>
+          </a:stretch>
+        </p:blipFill>
+        <p:spPr>
+          <a:xfrm>
+            <a:off x="3371574" y="2646668"/>
+            <a:ext cx="5249558" cy="2595287"/>
+          </a:xfrm>
+        </p:spPr>
+      </p:pic>
+    </p:spTree>
+    <p:extLst>
+      <p:ext uri="{BB962C8B-B14F-4D97-AF65-F5344CB8AC3E}">
+        <p14:creationId xmlns:p14="http://schemas.microsoft.com/office/powerpoint/2010/main" val="3618255462"/>
+      </p:ext>
+    </p:extLst>
+  </p:cSld>
+  <p:clrMapOvr>
+    <a:masterClrMapping/>
+  </p:clrMapOvr>
+</p:sld>
+</file>
+
+<file path=ppt/slides/slide11.xml><?xml version="1.0" encoding="utf-8"?>
+<p:sld xmlns:a="http://schemas.openxmlformats.org/drawingml/2006/main" xmlns:r="http://schemas.openxmlformats.org/officeDocument/2006/relationships" xmlns:p="http://schemas.openxmlformats.org/presentationml/2006/main">
+  <p:cSld>
+    <p:spTree>
+      <p:nvGrpSpPr>
+        <p:cNvPr id="1" name=""/>
+        <p:cNvGrpSpPr/>
+        <p:nvPr/>
+      </p:nvGrpSpPr>
+      <p:grpSpPr>
+        <a:xfrm>
+          <a:off x="0" y="0"/>
+          <a:ext cx="0" cy="0"/>
+          <a:chOff x="0" y="0"/>
+          <a:chExt cx="0" cy="0"/>
+        </a:xfrm>
+      </p:grpSpPr>
+      <p:sp>
+        <p:nvSpPr>
+          <p:cNvPr id="2" name="Tytuł 1">
+            <a:extLst>
+              <a:ext uri="{FF2B5EF4-FFF2-40B4-BE49-F238E27FC236}">
                 <a16:creationId xmlns:a16="http://schemas.microsoft.com/office/drawing/2014/main" id="{582B020A-B2D6-C55D-0070-4647A22ACD85}"/>
               </a:ext>
             </a:extLst>
@@ -13036,10 +13133,10 @@
       </p:sp>
       <p:pic>
         <p:nvPicPr>
-          <p:cNvPr id="7" name="Symbol zastępczy zawartości 6">
+          <p:cNvPr id="6" name="Symbol zastępczy zawartości 5">
             <a:extLst>
               <a:ext uri="{FF2B5EF4-FFF2-40B4-BE49-F238E27FC236}">
-                <a16:creationId xmlns:a16="http://schemas.microsoft.com/office/drawing/2014/main" id="{56839E19-1DA3-04AD-6EF4-619D6C913777}"/>
+                <a16:creationId xmlns:a16="http://schemas.microsoft.com/office/drawing/2014/main" id="{15A2B441-B5A0-6603-E0FD-62BEDC7654BE}"/>
               </a:ext>
             </a:extLst>
           </p:cNvPr>
@@ -13058,8 +13155,8 @@
         </p:blipFill>
         <p:spPr>
           <a:xfrm>
-            <a:off x="273617" y="811038"/>
-            <a:ext cx="6697550" cy="4503345"/>
+            <a:off x="847025" y="320861"/>
+            <a:ext cx="5906859" cy="5906859"/>
           </a:xfrm>
         </p:spPr>
       </p:pic>
@@ -13076,7 +13173,7 @@
 </p:sld>
 </file>
 
-<file path=ppt/slides/slide11.xml><?xml version="1.0" encoding="utf-8"?>
+<file path=ppt/slides/slide12.xml><?xml version="1.0" encoding="utf-8"?>
 <p:sld xmlns:a="http://schemas.openxmlformats.org/drawingml/2006/main" xmlns:r="http://schemas.openxmlformats.org/officeDocument/2006/relationships" xmlns:p="http://schemas.openxmlformats.org/presentationml/2006/main">
   <p:cSld>
     <p:spTree>
@@ -13189,7 +13286,7 @@
 </p:sld>
 </file>
 
-<file path=ppt/slides/slide12.xml><?xml version="1.0" encoding="utf-8"?>
+<file path=ppt/slides/slide13.xml><?xml version="1.0" encoding="utf-8"?>
 <p:sld xmlns:a="http://schemas.openxmlformats.org/drawingml/2006/main" xmlns:r="http://schemas.openxmlformats.org/officeDocument/2006/relationships" xmlns:p="http://schemas.openxmlformats.org/presentationml/2006/main">
   <p:cSld>
     <p:spTree>
@@ -13254,19 +13351,17 @@
       </p:sp>
       <p:pic>
         <p:nvPicPr>
-          <p:cNvPr id="5" name="Symbol zastępczy zawartości 4">
+          <p:cNvPr id="7" name="Obraz 6">
             <a:extLst>
               <a:ext uri="{FF2B5EF4-FFF2-40B4-BE49-F238E27FC236}">
-                <a16:creationId xmlns:a16="http://schemas.microsoft.com/office/drawing/2014/main" id="{69DEFFD4-76BB-7038-3DE7-74EB8F47D771}"/>
+                <a16:creationId xmlns:a16="http://schemas.microsoft.com/office/drawing/2014/main" id="{FFBDFCDA-A3A2-E632-3D22-89672739347C}"/>
               </a:ext>
             </a:extLst>
           </p:cNvPr>
           <p:cNvPicPr>
-            <a:picLocks noGrp="1" noChangeAspect="1"/>
+            <a:picLocks noChangeAspect="1"/>
           </p:cNvPicPr>
-          <p:nvPr>
-            <p:ph idx="1"/>
-          </p:nvPr>
+          <p:nvPr/>
         </p:nvPicPr>
         <p:blipFill>
           <a:blip r:embed="rId2"/>
@@ -13276,9 +13371,12 @@
         </p:blipFill>
         <p:spPr>
           <a:xfrm>
-            <a:off x="1704988" y="3123633"/>
-            <a:ext cx="8593148" cy="2607209"/>
+            <a:off x="2002726" y="2319992"/>
+            <a:ext cx="8183371" cy="3982864"/>
           </a:xfrm>
+          <a:prstGeom prst="rect">
+            <a:avLst/>
+          </a:prstGeom>
         </p:spPr>
       </p:pic>
     </p:spTree>
@@ -13294,7 +13392,7 @@
 </p:sld>
 </file>
 
-<file path=ppt/slides/slide13.xml><?xml version="1.0" encoding="utf-8"?>
+<file path=ppt/slides/slide14.xml><?xml version="1.0" encoding="utf-8"?>
 <p:sld xmlns:a="http://schemas.openxmlformats.org/drawingml/2006/main" xmlns:r="http://schemas.openxmlformats.org/officeDocument/2006/relationships" xmlns:p="http://schemas.openxmlformats.org/presentationml/2006/main">
   <p:cSld>
     <p:spTree>
@@ -13344,17 +13442,17 @@
             </a:br>
             <a:r>
               <a:rPr lang="pl-PL" dirty="0"/>
-              <a:t>Funkcja sortuje przedziały według ich dolnych granic.</a:t>
+              <a:t>Utworzenie wykresu z posortowanymi entropiami</a:t>
             </a:r>
           </a:p>
         </p:txBody>
       </p:sp>
       <p:pic>
         <p:nvPicPr>
-          <p:cNvPr id="9" name="Symbol zastępczy zawartości 8">
+          <p:cNvPr id="6" name="Symbol zastępczy zawartości 5">
             <a:extLst>
               <a:ext uri="{FF2B5EF4-FFF2-40B4-BE49-F238E27FC236}">
-                <a16:creationId xmlns:a16="http://schemas.microsoft.com/office/drawing/2014/main" id="{9888039F-0AC2-F8BF-014F-F5F626A5D191}"/>
+                <a16:creationId xmlns:a16="http://schemas.microsoft.com/office/drawing/2014/main" id="{7474FDFB-FAD0-9516-C5A9-6B853EB1F2E6}"/>
               </a:ext>
             </a:extLst>
           </p:cNvPr>
@@ -13373,8 +13471,8 @@
         </p:blipFill>
         <p:spPr>
           <a:xfrm>
-            <a:off x="1406641" y="3154802"/>
-            <a:ext cx="9378717" cy="1471519"/>
+            <a:off x="2322513" y="2467769"/>
+            <a:ext cx="7543800" cy="3105150"/>
           </a:xfrm>
         </p:spPr>
       </p:pic>
@@ -13391,7 +13489,7 @@
 </p:sld>
 </file>
 
-<file path=ppt/slides/slide14.xml><?xml version="1.0" encoding="utf-8"?>
+<file path=ppt/slides/slide15.xml><?xml version="1.0" encoding="utf-8"?>
 <p:sld xmlns:a="http://schemas.openxmlformats.org/drawingml/2006/main" xmlns:r="http://schemas.openxmlformats.org/officeDocument/2006/relationships" xmlns:p="http://schemas.openxmlformats.org/presentationml/2006/main">
   <p:cSld>
     <p:spTree>
@@ -13424,7 +13522,12 @@
             <p:ph type="title"/>
           </p:nvPr>
         </p:nvSpPr>
-        <p:spPr/>
+        <p:spPr>
+          <a:xfrm>
+            <a:off x="1008064" y="890122"/>
+            <a:ext cx="9905998" cy="1478570"/>
+          </a:xfrm>
+        </p:spPr>
         <p:txBody>
           <a:bodyPr/>
           <a:lstStyle/>
@@ -13439,10 +13542,10 @@
       </p:sp>
       <p:pic>
         <p:nvPicPr>
-          <p:cNvPr id="5" name="Symbol zastępczy zawartości 4">
+          <p:cNvPr id="7" name="Symbol zastępczy zawartości 6">
             <a:extLst>
               <a:ext uri="{FF2B5EF4-FFF2-40B4-BE49-F238E27FC236}">
-                <a16:creationId xmlns:a16="http://schemas.microsoft.com/office/drawing/2014/main" id="{9C5CB142-5C09-7E72-EE0D-024BDD61D5DD}"/>
+                <a16:creationId xmlns:a16="http://schemas.microsoft.com/office/drawing/2014/main" id="{CE5BD600-F688-A318-86FD-4A2950F10D93}"/>
               </a:ext>
             </a:extLst>
           </p:cNvPr>
@@ -13461,8 +13564,8 @@
         </p:blipFill>
         <p:spPr>
           <a:xfrm>
-            <a:off x="3603278" y="2517004"/>
-            <a:ext cx="5172987" cy="2733190"/>
+            <a:off x="1274762" y="3067050"/>
+            <a:ext cx="9639300" cy="723900"/>
           </a:xfrm>
         </p:spPr>
       </p:pic>
@@ -13479,7 +13582,96 @@
 </p:sld>
 </file>
 
-<file path=ppt/slides/slide15.xml><?xml version="1.0" encoding="utf-8"?>
+<file path=ppt/slides/slide16.xml><?xml version="1.0" encoding="utf-8"?>
+<p:sld xmlns:a="http://schemas.openxmlformats.org/drawingml/2006/main" xmlns:r="http://schemas.openxmlformats.org/officeDocument/2006/relationships" xmlns:p="http://schemas.openxmlformats.org/presentationml/2006/main">
+  <p:cSld>
+    <p:spTree>
+      <p:nvGrpSpPr>
+        <p:cNvPr id="1" name=""/>
+        <p:cNvGrpSpPr/>
+        <p:nvPr/>
+      </p:nvGrpSpPr>
+      <p:grpSpPr>
+        <a:xfrm>
+          <a:off x="0" y="0"/>
+          <a:ext cx="0" cy="0"/>
+          <a:chOff x="0" y="0"/>
+          <a:chExt cx="0" cy="0"/>
+        </a:xfrm>
+      </p:grpSpPr>
+      <p:sp>
+        <p:nvSpPr>
+          <p:cNvPr id="2" name="Tytuł 1">
+            <a:extLst>
+              <a:ext uri="{FF2B5EF4-FFF2-40B4-BE49-F238E27FC236}">
+                <a16:creationId xmlns:a16="http://schemas.microsoft.com/office/drawing/2014/main" id="{FB3D57C4-7E47-AB92-A982-1ED7A7885F1B}"/>
+              </a:ext>
+            </a:extLst>
+          </p:cNvPr>
+          <p:cNvSpPr>
+            <a:spLocks noGrp="1"/>
+          </p:cNvSpPr>
+          <p:nvPr>
+            <p:ph type="title"/>
+          </p:nvPr>
+        </p:nvSpPr>
+        <p:spPr/>
+        <p:txBody>
+          <a:bodyPr/>
+          <a:lstStyle/>
+          <a:p>
+            <a:pPr algn="ctr"/>
+            <a:r>
+              <a:rPr lang="pl-PL" dirty="0"/>
+              <a:t>Wykres</a:t>
+            </a:r>
+          </a:p>
+        </p:txBody>
+      </p:sp>
+      <p:pic>
+        <p:nvPicPr>
+          <p:cNvPr id="4" name="Obraz 3">
+            <a:extLst>
+              <a:ext uri="{FF2B5EF4-FFF2-40B4-BE49-F238E27FC236}">
+                <a16:creationId xmlns:a16="http://schemas.microsoft.com/office/drawing/2014/main" id="{8AC662F5-CEAA-2DEC-9621-782EE2F8491D}"/>
+              </a:ext>
+            </a:extLst>
+          </p:cNvPr>
+          <p:cNvPicPr>
+            <a:picLocks noChangeAspect="1"/>
+          </p:cNvPicPr>
+          <p:nvPr/>
+        </p:nvPicPr>
+        <p:blipFill>
+          <a:blip r:embed="rId2"/>
+          <a:stretch>
+            <a:fillRect/>
+          </a:stretch>
+        </p:blipFill>
+        <p:spPr>
+          <a:xfrm>
+            <a:off x="2851842" y="1810106"/>
+            <a:ext cx="6717246" cy="4507185"/>
+          </a:xfrm>
+          <a:prstGeom prst="rect">
+            <a:avLst/>
+          </a:prstGeom>
+        </p:spPr>
+      </p:pic>
+    </p:spTree>
+    <p:extLst>
+      <p:ext uri="{BB962C8B-B14F-4D97-AF65-F5344CB8AC3E}">
+        <p14:creationId xmlns:p14="http://schemas.microsoft.com/office/powerpoint/2010/main" val="2444538633"/>
+      </p:ext>
+    </p:extLst>
+  </p:cSld>
+  <p:clrMapOvr>
+    <a:masterClrMapping/>
+  </p:clrMapOvr>
+</p:sld>
+</file>
+
+<file path=ppt/slides/slide17.xml><?xml version="1.0" encoding="utf-8"?>
 <p:sld xmlns:a="http://schemas.openxmlformats.org/drawingml/2006/main" xmlns:r="http://schemas.openxmlformats.org/officeDocument/2006/relationships" xmlns:p="http://schemas.openxmlformats.org/presentationml/2006/main">
   <p:cSld>
     <p:spTree>
@@ -13721,10 +13913,10 @@
       </p:sp>
       <p:pic>
         <p:nvPicPr>
-          <p:cNvPr id="15" name="Symbol zastępczy zawartości 14">
+          <p:cNvPr id="6" name="Symbol zastępczy zawartości 5">
             <a:extLst>
               <a:ext uri="{FF2B5EF4-FFF2-40B4-BE49-F238E27FC236}">
-                <a16:creationId xmlns:a16="http://schemas.microsoft.com/office/drawing/2014/main" id="{C0270555-F9E6-E150-C4F1-BEA8A747D234}"/>
+                <a16:creationId xmlns:a16="http://schemas.microsoft.com/office/drawing/2014/main" id="{F6F16595-F2DE-CEF2-6D52-EAB74EB6812D}"/>
               </a:ext>
             </a:extLst>
           </p:cNvPr>
@@ -13743,11 +13935,62 @@
         </p:blipFill>
         <p:spPr>
           <a:xfrm>
-            <a:off x="2086505" y="3168713"/>
-            <a:ext cx="8018989" cy="1788578"/>
+            <a:off x="2895600" y="2409825"/>
+            <a:ext cx="6400800" cy="2038350"/>
           </a:xfrm>
         </p:spPr>
       </p:pic>
+      <p:sp>
+        <p:nvSpPr>
+          <p:cNvPr id="7" name="pole tekstowe 6">
+            <a:extLst>
+              <a:ext uri="{FF2B5EF4-FFF2-40B4-BE49-F238E27FC236}">
+                <a16:creationId xmlns:a16="http://schemas.microsoft.com/office/drawing/2014/main" id="{C2B22A63-135A-7025-6A7E-3AA8C3D6F041}"/>
+              </a:ext>
+            </a:extLst>
+          </p:cNvPr>
+          <p:cNvSpPr txBox="1"/>
+          <p:nvPr/>
+        </p:nvSpPr>
+        <p:spPr>
+          <a:xfrm>
+            <a:off x="887240" y="5051834"/>
+            <a:ext cx="10755517" cy="369332"/>
+          </a:xfrm>
+          <a:prstGeom prst="rect">
+            <a:avLst/>
+          </a:prstGeom>
+          <a:noFill/>
+        </p:spPr>
+        <p:txBody>
+          <a:bodyPr wrap="square" rtlCol="0">
+            <a:spAutoFit/>
+          </a:bodyPr>
+          <a:lstStyle/>
+          <a:p>
+            <a:r>
+              <a:rPr lang="pl-PL" dirty="0"/>
+              <a:t>Importujemy także moduł </a:t>
+            </a:r>
+            <a:r>
+              <a:rPr lang="pl-PL" dirty="0" err="1"/>
+              <a:t>pyplot</a:t>
+            </a:r>
+            <a:r>
+              <a:rPr lang="pl-PL" dirty="0"/>
+              <a:t> z biblioteki </a:t>
+            </a:r>
+            <a:r>
+              <a:rPr lang="pl-PL" dirty="0" err="1"/>
+              <a:t>matplotlib</a:t>
+            </a:r>
+            <a:r>
+              <a:rPr lang="pl-PL" dirty="0"/>
+              <a:t>, żeby później wypisać entropie tych zbiorów na wykresie</a:t>
+            </a:r>
+          </a:p>
+        </p:txBody>
+      </p:sp>
     </p:spTree>
     <p:extLst>
       <p:ext uri="{BB962C8B-B14F-4D97-AF65-F5344CB8AC3E}">
@@ -13813,35 +14056,6 @@
           </a:p>
         </p:txBody>
       </p:sp>
-      <p:pic>
-        <p:nvPicPr>
-          <p:cNvPr id="6" name="Symbol zastępczy zawartości 5">
-            <a:extLst>
-              <a:ext uri="{FF2B5EF4-FFF2-40B4-BE49-F238E27FC236}">
-                <a16:creationId xmlns:a16="http://schemas.microsoft.com/office/drawing/2014/main" id="{BB3AC40B-1EF7-5DFD-2097-5CD18AA0C257}"/>
-              </a:ext>
-            </a:extLst>
-          </p:cNvPr>
-          <p:cNvPicPr>
-            <a:picLocks noGrp="1" noChangeAspect="1"/>
-          </p:cNvPicPr>
-          <p:nvPr>
-            <p:ph idx="1"/>
-          </p:nvPr>
-        </p:nvPicPr>
-        <p:blipFill>
-          <a:blip r:embed="rId2"/>
-          <a:stretch>
-            <a:fillRect/>
-          </a:stretch>
-        </p:blipFill>
-        <p:spPr>
-          <a:xfrm>
-            <a:off x="2806967" y="1717895"/>
-            <a:ext cx="6578066" cy="3271813"/>
-          </a:xfrm>
-        </p:spPr>
-      </p:pic>
       <p:sp>
         <p:nvSpPr>
           <p:cNvPr id="8" name="pole tekstowe 7">
@@ -13889,6 +14103,35 @@
           </a:p>
         </p:txBody>
       </p:sp>
+      <p:pic>
+        <p:nvPicPr>
+          <p:cNvPr id="12" name="Symbol zastępczy zawartości 11">
+            <a:extLst>
+              <a:ext uri="{FF2B5EF4-FFF2-40B4-BE49-F238E27FC236}">
+                <a16:creationId xmlns:a16="http://schemas.microsoft.com/office/drawing/2014/main" id="{A38F2C56-A84B-2B57-86AA-36699534C321}"/>
+              </a:ext>
+            </a:extLst>
+          </p:cNvPr>
+          <p:cNvPicPr>
+            <a:picLocks noGrp="1" noChangeAspect="1"/>
+          </p:cNvPicPr>
+          <p:nvPr>
+            <p:ph idx="1"/>
+          </p:nvPr>
+        </p:nvPicPr>
+        <p:blipFill>
+          <a:blip r:embed="rId2"/>
+          <a:stretch>
+            <a:fillRect/>
+          </a:stretch>
+        </p:blipFill>
+        <p:spPr>
+          <a:xfrm>
+            <a:off x="2930651" y="1574447"/>
+            <a:ext cx="6200775" cy="3533775"/>
+          </a:xfrm>
+        </p:spPr>
+      </p:pic>
     </p:spTree>
     <p:extLst>
       <p:ext uri="{BB962C8B-B14F-4D97-AF65-F5344CB8AC3E}">
@@ -13903,6 +14146,179 @@
 </file>
 
 <file path=ppt/slides/slide5.xml><?xml version="1.0" encoding="utf-8"?>
+<p:sld xmlns:a="http://schemas.openxmlformats.org/drawingml/2006/main" xmlns:r="http://schemas.openxmlformats.org/officeDocument/2006/relationships" xmlns:p="http://schemas.openxmlformats.org/presentationml/2006/main">
+  <p:cSld>
+    <p:spTree>
+      <p:nvGrpSpPr>
+        <p:cNvPr id="1" name=""/>
+        <p:cNvGrpSpPr/>
+        <p:nvPr/>
+      </p:nvGrpSpPr>
+      <p:grpSpPr>
+        <a:xfrm>
+          <a:off x="0" y="0"/>
+          <a:ext cx="0" cy="0"/>
+          <a:chOff x="0" y="0"/>
+          <a:chExt cx="0" cy="0"/>
+        </a:xfrm>
+      </p:grpSpPr>
+      <p:sp>
+        <p:nvSpPr>
+          <p:cNvPr id="2" name="Tytuł 1">
+            <a:extLst>
+              <a:ext uri="{FF2B5EF4-FFF2-40B4-BE49-F238E27FC236}">
+                <a16:creationId xmlns:a16="http://schemas.microsoft.com/office/drawing/2014/main" id="{CD8FAC3B-83E9-FC38-9588-0F35238C7AA2}"/>
+              </a:ext>
+            </a:extLst>
+          </p:cNvPr>
+          <p:cNvSpPr>
+            <a:spLocks noGrp="1"/>
+          </p:cNvSpPr>
+          <p:nvPr>
+            <p:ph type="title"/>
+          </p:nvPr>
+        </p:nvSpPr>
+        <p:spPr/>
+        <p:txBody>
+          <a:bodyPr/>
+          <a:lstStyle/>
+          <a:p>
+            <a:r>
+              <a:rPr lang="pl-PL" dirty="0"/>
+              <a:t>Definicja funkcji </a:t>
+            </a:r>
+            <a:r>
+              <a:rPr lang="pl-PL" dirty="0" err="1"/>
+              <a:t>possible_order</a:t>
+            </a:r>
+            <a:r>
+              <a:rPr lang="pl-PL" dirty="0"/>
+              <a:t> oraz </a:t>
+            </a:r>
+            <a:r>
+              <a:rPr lang="pl-PL" dirty="0" err="1"/>
+              <a:t>width</a:t>
+            </a:r>
+            <a:endParaRPr lang="pl-PL" dirty="0"/>
+          </a:p>
+        </p:txBody>
+      </p:sp>
+      <p:pic>
+        <p:nvPicPr>
+          <p:cNvPr id="5" name="Symbol zastępczy zawartości 4">
+            <a:extLst>
+              <a:ext uri="{FF2B5EF4-FFF2-40B4-BE49-F238E27FC236}">
+                <a16:creationId xmlns:a16="http://schemas.microsoft.com/office/drawing/2014/main" id="{D4C78E9C-6B60-906A-B63F-5AA0EE24C533}"/>
+              </a:ext>
+            </a:extLst>
+          </p:cNvPr>
+          <p:cNvPicPr>
+            <a:picLocks noGrp="1" noChangeAspect="1"/>
+          </p:cNvPicPr>
+          <p:nvPr>
+            <p:ph idx="1"/>
+          </p:nvPr>
+        </p:nvPicPr>
+        <p:blipFill>
+          <a:blip r:embed="rId2"/>
+          <a:stretch>
+            <a:fillRect/>
+          </a:stretch>
+        </p:blipFill>
+        <p:spPr>
+          <a:xfrm>
+            <a:off x="3402076" y="1991990"/>
+            <a:ext cx="5384671" cy="2768923"/>
+          </a:xfrm>
+        </p:spPr>
+      </p:pic>
+      <p:sp>
+        <p:nvSpPr>
+          <p:cNvPr id="6" name="pole tekstowe 5">
+            <a:extLst>
+              <a:ext uri="{FF2B5EF4-FFF2-40B4-BE49-F238E27FC236}">
+                <a16:creationId xmlns:a16="http://schemas.microsoft.com/office/drawing/2014/main" id="{0E15DFC1-F383-78F6-CF24-CFD2128A1810}"/>
+              </a:ext>
+            </a:extLst>
+          </p:cNvPr>
+          <p:cNvSpPr txBox="1"/>
+          <p:nvPr/>
+        </p:nvSpPr>
+        <p:spPr>
+          <a:xfrm>
+            <a:off x="914400" y="5024673"/>
+            <a:ext cx="10954693" cy="923330"/>
+          </a:xfrm>
+          <a:prstGeom prst="rect">
+            <a:avLst/>
+          </a:prstGeom>
+          <a:noFill/>
+        </p:spPr>
+        <p:txBody>
+          <a:bodyPr wrap="square" rtlCol="0">
+            <a:spAutoFit/>
+          </a:bodyPr>
+          <a:lstStyle/>
+          <a:p>
+            <a:r>
+              <a:rPr lang="pl-PL" dirty="0"/>
+              <a:t>Funkcja </a:t>
+            </a:r>
+            <a:r>
+              <a:rPr lang="pl-PL" dirty="0" err="1"/>
+              <a:t>possible_order</a:t>
+            </a:r>
+            <a:r>
+              <a:rPr lang="pl-PL" dirty="0"/>
+              <a:t>, sprawdza, czy porządek </a:t>
+            </a:r>
+            <a:r>
+              <a:rPr lang="pl-PL" dirty="0" err="1"/>
+              <a:t>possible</a:t>
+            </a:r>
+            <a:r>
+              <a:rPr lang="pl-PL" dirty="0"/>
+              <a:t> jest możliwy w obie strony dwóch przedziałów, zwraca wartość True, jeżeli warunek jest spełniony, a </a:t>
+            </a:r>
+            <a:r>
+              <a:rPr lang="pl-PL" dirty="0" err="1"/>
+              <a:t>False</a:t>
+            </a:r>
+            <a:r>
+              <a:rPr lang="pl-PL" dirty="0"/>
+              <a:t> w przeciwnym razie.</a:t>
+            </a:r>
+          </a:p>
+          <a:p>
+            <a:r>
+              <a:rPr lang="pl-PL" dirty="0"/>
+              <a:t>Funkcja </a:t>
+            </a:r>
+            <a:r>
+              <a:rPr lang="pl-PL" dirty="0" err="1"/>
+              <a:t>width</a:t>
+            </a:r>
+            <a:r>
+              <a:rPr lang="pl-PL" dirty="0"/>
+              <a:t> oblicza szerokość przedziału.</a:t>
+            </a:r>
+          </a:p>
+        </p:txBody>
+      </p:sp>
+    </p:spTree>
+    <p:extLst>
+      <p:ext uri="{BB962C8B-B14F-4D97-AF65-F5344CB8AC3E}">
+        <p14:creationId xmlns:p14="http://schemas.microsoft.com/office/powerpoint/2010/main" val="566855048"/>
+      </p:ext>
+    </p:extLst>
+  </p:cSld>
+  <p:clrMapOvr>
+    <a:masterClrMapping/>
+  </p:clrMapOvr>
+</p:sld>
+</file>
+
+<file path=ppt/slides/slide6.xml><?xml version="1.0" encoding="utf-8"?>
 <p:sld xmlns:a="http://schemas.openxmlformats.org/drawingml/2006/main" xmlns:r="http://schemas.openxmlformats.org/officeDocument/2006/relationships" xmlns:p="http://schemas.openxmlformats.org/presentationml/2006/main">
   <p:cSld>
     <p:spTree>
@@ -13953,35 +14369,6 @@
           </a:p>
         </p:txBody>
       </p:sp>
-      <p:pic>
-        <p:nvPicPr>
-          <p:cNvPr id="7" name="Symbol zastępczy zawartości 6">
-            <a:extLst>
-              <a:ext uri="{FF2B5EF4-FFF2-40B4-BE49-F238E27FC236}">
-                <a16:creationId xmlns:a16="http://schemas.microsoft.com/office/drawing/2014/main" id="{8CF1ACE5-49C5-364B-D653-B96177440B0E}"/>
-              </a:ext>
-            </a:extLst>
-          </p:cNvPr>
-          <p:cNvPicPr>
-            <a:picLocks noGrp="1" noChangeAspect="1"/>
-          </p:cNvPicPr>
-          <p:nvPr>
-            <p:ph idx="1"/>
-          </p:nvPr>
-        </p:nvPicPr>
-        <p:blipFill>
-          <a:blip r:embed="rId2"/>
-          <a:stretch>
-            <a:fillRect/>
-          </a:stretch>
-        </p:blipFill>
-        <p:spPr>
-          <a:xfrm>
-            <a:off x="3549892" y="1662521"/>
-            <a:ext cx="5273283" cy="3025455"/>
-          </a:xfrm>
-        </p:spPr>
-      </p:pic>
       <p:sp>
         <p:nvSpPr>
           <p:cNvPr id="8" name="pole tekstowe 7">
@@ -14049,6 +14436,35 @@
           </a:p>
         </p:txBody>
       </p:sp>
+      <p:pic>
+        <p:nvPicPr>
+          <p:cNvPr id="6" name="Symbol zastępczy zawartości 5">
+            <a:extLst>
+              <a:ext uri="{FF2B5EF4-FFF2-40B4-BE49-F238E27FC236}">
+                <a16:creationId xmlns:a16="http://schemas.microsoft.com/office/drawing/2014/main" id="{2D0BD8FA-BB69-6A41-7DC7-089083DA4792}"/>
+              </a:ext>
+            </a:extLst>
+          </p:cNvPr>
+          <p:cNvPicPr>
+            <a:picLocks noGrp="1" noChangeAspect="1"/>
+          </p:cNvPicPr>
+          <p:nvPr>
+            <p:ph idx="1"/>
+          </p:nvPr>
+        </p:nvPicPr>
+        <p:blipFill>
+          <a:blip r:embed="rId2"/>
+          <a:stretch>
+            <a:fillRect/>
+          </a:stretch>
+        </p:blipFill>
+        <p:spPr>
+          <a:xfrm>
+            <a:off x="3457575" y="1906965"/>
+            <a:ext cx="5276850" cy="2609850"/>
+          </a:xfrm>
+        </p:spPr>
+      </p:pic>
     </p:spTree>
     <p:extLst>
       <p:ext uri="{BB962C8B-B14F-4D97-AF65-F5344CB8AC3E}">
@@ -14062,7 +14478,7 @@
 </p:sld>
 </file>
 
-<file path=ppt/slides/slide6.xml><?xml version="1.0" encoding="utf-8"?>
+<file path=ppt/slides/slide7.xml><?xml version="1.0" encoding="utf-8"?>
 <p:sld xmlns:a="http://schemas.openxmlformats.org/drawingml/2006/main" xmlns:r="http://schemas.openxmlformats.org/officeDocument/2006/relationships" xmlns:p="http://schemas.openxmlformats.org/presentationml/2006/main">
   <p:cSld>
     <p:spTree>
@@ -14108,35 +14524,6 @@
           </a:p>
         </p:txBody>
       </p:sp>
-      <p:pic>
-        <p:nvPicPr>
-          <p:cNvPr id="7" name="Symbol zastępczy zawartości 6">
-            <a:extLst>
-              <a:ext uri="{FF2B5EF4-FFF2-40B4-BE49-F238E27FC236}">
-                <a16:creationId xmlns:a16="http://schemas.microsoft.com/office/drawing/2014/main" id="{BB347B58-466F-F799-5B16-AA0083C9A93E}"/>
-              </a:ext>
-            </a:extLst>
-          </p:cNvPr>
-          <p:cNvPicPr>
-            <a:picLocks noGrp="1" noChangeAspect="1"/>
-          </p:cNvPicPr>
-          <p:nvPr>
-            <p:ph idx="1"/>
-          </p:nvPr>
-        </p:nvPicPr>
-        <p:blipFill>
-          <a:blip r:embed="rId2"/>
-          <a:stretch>
-            <a:fillRect/>
-          </a:stretch>
-        </p:blipFill>
-        <p:spPr>
-          <a:xfrm>
-            <a:off x="1960158" y="1887576"/>
-            <a:ext cx="8452754" cy="2735797"/>
-          </a:xfrm>
-        </p:spPr>
-      </p:pic>
       <p:sp>
         <p:nvSpPr>
           <p:cNvPr id="8" name="pole tekstowe 7">
@@ -14167,13 +14554,29 @@
           <a:p>
             <a:r>
               <a:rPr lang="pl-PL" dirty="0"/>
-              <a:t>Funkcja podobieństwo oblicza miary podobieństwa między przedziałami z listy A, a ich negacjami z listy AN.</a:t>
-            </a:r>
-          </a:p>
-          <a:p>
+              <a:t>Funkcja </a:t>
+            </a:r>
+            <a:r>
+              <a:rPr lang="pl-PL" dirty="0" err="1"/>
+              <a:t>similarity</a:t>
+            </a:r>
             <a:r>
               <a:rPr lang="pl-PL" dirty="0"/>
-              <a:t>Wykorzystuje do tego funkcję podobieństwo, która oblicza miary pierwszeństwa dla par przedziałów.</a:t>
+              <a:t> oblicza miary podobieństwa między przedziałami z listy A, a ich negacjami z listy AN.</a:t>
+            </a:r>
+          </a:p>
+          <a:p>
+            <a:r>
+              <a:rPr lang="pl-PL" dirty="0"/>
+              <a:t>Wykorzystuje do tego funkcję </a:t>
+            </a:r>
+            <a:r>
+              <a:rPr lang="pl-PL" dirty="0" err="1"/>
+              <a:t>precedence</a:t>
+            </a:r>
+            <a:r>
+              <a:rPr lang="pl-PL" dirty="0"/>
+              <a:t>, która oblicza miary pierwszeństwa dla par przedziałów.</a:t>
             </a:r>
           </a:p>
           <a:p>
@@ -14183,7 +14586,7 @@
             </a:r>
             <a:r>
               <a:rPr lang="pl-PL" dirty="0" err="1"/>
-              <a:t>wartosci_podobieństwa</a:t>
+              <a:t>s_values</a:t>
             </a:r>
             <a:r>
               <a:rPr lang="pl-PL" dirty="0"/>
@@ -14192,6 +14595,35 @@
           </a:p>
         </p:txBody>
       </p:sp>
+      <p:pic>
+        <p:nvPicPr>
+          <p:cNvPr id="6" name="Symbol zastępczy zawartości 5">
+            <a:extLst>
+              <a:ext uri="{FF2B5EF4-FFF2-40B4-BE49-F238E27FC236}">
+                <a16:creationId xmlns:a16="http://schemas.microsoft.com/office/drawing/2014/main" id="{1E5428E5-D299-5148-DD0A-6B97B0568E0E}"/>
+              </a:ext>
+            </a:extLst>
+          </p:cNvPr>
+          <p:cNvPicPr>
+            <a:picLocks noGrp="1" noChangeAspect="1"/>
+          </p:cNvPicPr>
+          <p:nvPr>
+            <p:ph idx="1"/>
+          </p:nvPr>
+        </p:nvPicPr>
+        <p:blipFill>
+          <a:blip r:embed="rId2"/>
+          <a:stretch>
+            <a:fillRect/>
+          </a:stretch>
+        </p:blipFill>
+        <p:spPr>
+          <a:xfrm>
+            <a:off x="2633856" y="1863823"/>
+            <a:ext cx="6921112" cy="2781906"/>
+          </a:xfrm>
+        </p:spPr>
+      </p:pic>
     </p:spTree>
     <p:extLst>
       <p:ext uri="{BB962C8B-B14F-4D97-AF65-F5344CB8AC3E}">
@@ -14205,7 +14637,7 @@
 </p:sld>
 </file>
 
-<file path=ppt/slides/slide7.xml><?xml version="1.0" encoding="utf-8"?>
+<file path=ppt/slides/slide8.xml><?xml version="1.0" encoding="utf-8"?>
 <p:sld xmlns:a="http://schemas.openxmlformats.org/drawingml/2006/main" xmlns:r="http://schemas.openxmlformats.org/officeDocument/2006/relationships" xmlns:p="http://schemas.openxmlformats.org/presentationml/2006/main">
   <p:cSld>
     <p:spTree>
@@ -14253,10 +14685,10 @@
       </p:sp>
       <p:pic>
         <p:nvPicPr>
-          <p:cNvPr id="7" name="Symbol zastępczy zawartości 6">
+          <p:cNvPr id="6" name="Symbol zastępczy zawartości 5">
             <a:extLst>
               <a:ext uri="{FF2B5EF4-FFF2-40B4-BE49-F238E27FC236}">
-                <a16:creationId xmlns:a16="http://schemas.microsoft.com/office/drawing/2014/main" id="{C4766378-C428-C5D6-4405-5BB421A8FFD7}"/>
+                <a16:creationId xmlns:a16="http://schemas.microsoft.com/office/drawing/2014/main" id="{72A0C3B8-D1E3-261A-0273-819975BA2B18}"/>
               </a:ext>
             </a:extLst>
           </p:cNvPr>
@@ -14275,8 +14707,8 @@
         </p:blipFill>
         <p:spPr>
           <a:xfrm>
-            <a:off x="778754" y="3146881"/>
-            <a:ext cx="10634491" cy="1196520"/>
+            <a:off x="1462242" y="2748229"/>
+            <a:ext cx="9267515" cy="1590506"/>
           </a:xfrm>
         </p:spPr>
       </p:pic>
@@ -14293,7 +14725,7 @@
 </p:sld>
 </file>
 
-<file path=ppt/slides/slide8.xml><?xml version="1.0" encoding="utf-8"?>
+<file path=ppt/slides/slide9.xml><?xml version="1.0" encoding="utf-8"?>
 <p:sld xmlns:a="http://schemas.openxmlformats.org/drawingml/2006/main" xmlns:r="http://schemas.openxmlformats.org/officeDocument/2006/relationships" xmlns:p="http://schemas.openxmlformats.org/presentationml/2006/main">
   <p:cSld>
     <p:spTree>
@@ -14328,8 +14760,8 @@
         </p:nvSpPr>
         <p:spPr>
           <a:xfrm>
-            <a:off x="9134947" y="609600"/>
-            <a:ext cx="2839770" cy="5791200"/>
+            <a:off x="556788" y="519066"/>
+            <a:ext cx="11078424" cy="1680927"/>
           </a:xfrm>
         </p:spPr>
         <p:txBody>
@@ -14347,10 +14779,10 @@
       </p:sp>
       <p:pic>
         <p:nvPicPr>
-          <p:cNvPr id="7" name="Symbol zastępczy zawartości 6">
+          <p:cNvPr id="6" name="Symbol zastępczy zawartości 5">
             <a:extLst>
               <a:ext uri="{FF2B5EF4-FFF2-40B4-BE49-F238E27FC236}">
-                <a16:creationId xmlns:a16="http://schemas.microsoft.com/office/drawing/2014/main" id="{4DC7474D-F69B-9658-84A6-E3CB8CF7CA85}"/>
+                <a16:creationId xmlns:a16="http://schemas.microsoft.com/office/drawing/2014/main" id="{2D51EE95-A5EC-4B90-1EC4-4654B18DBFE6}"/>
               </a:ext>
             </a:extLst>
           </p:cNvPr>
@@ -14369,8 +14801,8 @@
         </p:blipFill>
         <p:spPr>
           <a:xfrm>
-            <a:off x="217283" y="367420"/>
-            <a:ext cx="8682274" cy="5880980"/>
+            <a:off x="2299502" y="2387137"/>
+            <a:ext cx="7010400" cy="2705100"/>
           </a:xfrm>
         </p:spPr>
       </p:pic>
@@ -14378,101 +14810,6 @@
     <p:extLst>
       <p:ext uri="{BB962C8B-B14F-4D97-AF65-F5344CB8AC3E}">
         <p14:creationId xmlns:p14="http://schemas.microsoft.com/office/powerpoint/2010/main" val="1387002254"/>
-      </p:ext>
-    </p:extLst>
-  </p:cSld>
-  <p:clrMapOvr>
-    <a:masterClrMapping/>
-  </p:clrMapOvr>
-</p:sld>
-</file>
-
-<file path=ppt/slides/slide9.xml><?xml version="1.0" encoding="utf-8"?>
-<p:sld xmlns:a="http://schemas.openxmlformats.org/drawingml/2006/main" xmlns:r="http://schemas.openxmlformats.org/officeDocument/2006/relationships" xmlns:p="http://schemas.openxmlformats.org/presentationml/2006/main">
-  <p:cSld>
-    <p:spTree>
-      <p:nvGrpSpPr>
-        <p:cNvPr id="1" name=""/>
-        <p:cNvGrpSpPr/>
-        <p:nvPr/>
-      </p:nvGrpSpPr>
-      <p:grpSpPr>
-        <a:xfrm>
-          <a:off x="0" y="0"/>
-          <a:ext cx="0" cy="0"/>
-          <a:chOff x="0" y="0"/>
-          <a:chExt cx="0" cy="0"/>
-        </a:xfrm>
-      </p:grpSpPr>
-      <p:sp>
-        <p:nvSpPr>
-          <p:cNvPr id="2" name="Tytuł 1">
-            <a:extLst>
-              <a:ext uri="{FF2B5EF4-FFF2-40B4-BE49-F238E27FC236}">
-                <a16:creationId xmlns:a16="http://schemas.microsoft.com/office/drawing/2014/main" id="{C3FB3FE0-8103-C281-783D-D81E9602BA8F}"/>
-              </a:ext>
-            </a:extLst>
-          </p:cNvPr>
-          <p:cNvSpPr>
-            <a:spLocks noGrp="1"/>
-          </p:cNvSpPr>
-          <p:nvPr>
-            <p:ph type="title"/>
-          </p:nvPr>
-        </p:nvSpPr>
-        <p:spPr/>
-        <p:txBody>
-          <a:bodyPr/>
-          <a:lstStyle/>
-          <a:p>
-            <a:pPr algn="ctr"/>
-            <a:r>
-              <a:rPr lang="pl-PL" dirty="0"/>
-              <a:t>Krok 1:</a:t>
-            </a:r>
-            <a:br>
-              <a:rPr lang="pl-PL" dirty="0"/>
-            </a:br>
-            <a:r>
-              <a:rPr lang="pl-PL" dirty="0"/>
-              <a:t>Negacja zbiorów</a:t>
-            </a:r>
-          </a:p>
-        </p:txBody>
-      </p:sp>
-      <p:pic>
-        <p:nvPicPr>
-          <p:cNvPr id="9" name="Symbol zastępczy zawartości 8">
-            <a:extLst>
-              <a:ext uri="{FF2B5EF4-FFF2-40B4-BE49-F238E27FC236}">
-                <a16:creationId xmlns:a16="http://schemas.microsoft.com/office/drawing/2014/main" id="{FE202858-7BED-BA01-5D8C-1F343767CBC9}"/>
-              </a:ext>
-            </a:extLst>
-          </p:cNvPr>
-          <p:cNvPicPr>
-            <a:picLocks noGrp="1" noChangeAspect="1"/>
-          </p:cNvPicPr>
-          <p:nvPr>
-            <p:ph idx="1"/>
-          </p:nvPr>
-        </p:nvPicPr>
-        <p:blipFill>
-          <a:blip r:embed="rId2"/>
-          <a:stretch>
-            <a:fillRect/>
-          </a:stretch>
-        </p:blipFill>
-        <p:spPr>
-          <a:xfrm>
-            <a:off x="3078179" y="2771426"/>
-            <a:ext cx="5904714" cy="2580579"/>
-          </a:xfrm>
-        </p:spPr>
-      </p:pic>
-    </p:spTree>
-    <p:extLst>
-      <p:ext uri="{BB962C8B-B14F-4D97-AF65-F5344CB8AC3E}">
-        <p14:creationId xmlns:p14="http://schemas.microsoft.com/office/powerpoint/2010/main" val="3618255462"/>
       </p:ext>
     </p:extLst>
   </p:cSld>

</xml_diff>